<commit_message>
After the mock presentation
</commit_message>
<xml_diff>
--- a/preliminary/Working/presentations/Sitara/PRU in Sitara Device.pptx
+++ b/preliminary/Working/presentations/Sitara/PRU in Sitara Device.pptx
@@ -5,7 +5,7 @@
     <p:sldMasterId id="2147483648" r:id="rId1"/>
   </p:sldMasterIdLst>
   <p:notesMasterIdLst>
-    <p:notesMasterId r:id="rId59"/>
+    <p:notesMasterId r:id="rId60"/>
   </p:notesMasterIdLst>
   <p:sldIdLst>
     <p:sldId id="336" r:id="rId2"/>
@@ -50,11 +50,11 @@
     <p:sldId id="313" r:id="rId41"/>
     <p:sldId id="314" r:id="rId42"/>
     <p:sldId id="315" r:id="rId43"/>
-    <p:sldId id="311" r:id="rId44"/>
-    <p:sldId id="303" r:id="rId45"/>
-    <p:sldId id="305" r:id="rId46"/>
-    <p:sldId id="306" r:id="rId47"/>
-    <p:sldId id="307" r:id="rId48"/>
+    <p:sldId id="340" r:id="rId44"/>
+    <p:sldId id="341" r:id="rId45"/>
+    <p:sldId id="342" r:id="rId46"/>
+    <p:sldId id="305" r:id="rId47"/>
+    <p:sldId id="343" r:id="rId48"/>
     <p:sldId id="309" r:id="rId49"/>
     <p:sldId id="310" r:id="rId50"/>
     <p:sldId id="282" r:id="rId51"/>
@@ -65,9 +65,10 @@
     <p:sldId id="286" r:id="rId56"/>
     <p:sldId id="287" r:id="rId57"/>
     <p:sldId id="322" r:id="rId58"/>
+    <p:sldId id="344" r:id="rId59"/>
   </p:sldIdLst>
   <p:sldSz cx="9144000" cy="6858000" type="screen4x3"/>
-  <p:notesSz cx="6858000" cy="9144000"/>
+  <p:notesSz cx="7023100" cy="9309100"/>
   <p:defaultTextStyle>
     <a:defPPr>
       <a:defRPr lang="en-US"/>
@@ -201,14 +202,14 @@
         <p:spPr>
           <a:xfrm>
             <a:off x="0" y="0"/>
-            <a:ext cx="2971800" cy="457200"/>
+            <a:ext cx="3043343" cy="465455"/>
           </a:xfrm>
           <a:prstGeom prst="rect">
             <a:avLst/>
           </a:prstGeom>
         </p:spPr>
         <p:txBody>
-          <a:bodyPr vert="horz" lIns="91440" tIns="45720" rIns="91440" bIns="45720" rtlCol="0"/>
+          <a:bodyPr vert="horz" lIns="93324" tIns="46662" rIns="93324" bIns="46662" rtlCol="0"/>
           <a:lstStyle>
             <a:lvl1pPr algn="l">
               <a:defRPr sz="1200"/>
@@ -231,15 +232,15 @@
         </p:nvSpPr>
         <p:spPr>
           <a:xfrm>
-            <a:off x="3884613" y="0"/>
-            <a:ext cx="2971800" cy="457200"/>
+            <a:off x="3978132" y="0"/>
+            <a:ext cx="3043343" cy="465455"/>
           </a:xfrm>
           <a:prstGeom prst="rect">
             <a:avLst/>
           </a:prstGeom>
         </p:spPr>
         <p:txBody>
-          <a:bodyPr vert="horz" lIns="91440" tIns="45720" rIns="91440" bIns="45720" rtlCol="0"/>
+          <a:bodyPr vert="horz" lIns="93324" tIns="46662" rIns="93324" bIns="46662" rtlCol="0"/>
           <a:lstStyle>
             <a:lvl1pPr algn="r">
               <a:defRPr sz="1200"/>
@@ -248,7 +249,7 @@
           <a:p>
             <a:fld id="{8175A721-DFAB-4E45-89A8-776EFE3A7B3A}" type="datetimeFigureOut">
               <a:rPr lang="en-US" smtClean="0"/>
-              <a:t>11/6/2014</a:t>
+              <a:t>11/7/2014</a:t>
             </a:fld>
             <a:endParaRPr lang="en-US" dirty="0"/>
           </a:p>
@@ -266,8 +267,8 @@
         </p:nvSpPr>
         <p:spPr>
           <a:xfrm>
-            <a:off x="1143000" y="685800"/>
-            <a:ext cx="4572000" cy="3429000"/>
+            <a:off x="1184275" y="698500"/>
+            <a:ext cx="4654550" cy="3490913"/>
           </a:xfrm>
           <a:prstGeom prst="rect">
             <a:avLst/>
@@ -280,7 +281,7 @@
           </a:ln>
         </p:spPr>
         <p:txBody>
-          <a:bodyPr vert="horz" lIns="91440" tIns="45720" rIns="91440" bIns="45720" rtlCol="0" anchor="ctr"/>
+          <a:bodyPr vert="horz" lIns="93324" tIns="46662" rIns="93324" bIns="46662" rtlCol="0" anchor="ctr"/>
           <a:lstStyle/>
           <a:p>
             <a:endParaRPr lang="en-US" dirty="0"/>
@@ -299,15 +300,15 @@
         </p:nvSpPr>
         <p:spPr>
           <a:xfrm>
-            <a:off x="685800" y="4343400"/>
-            <a:ext cx="5486400" cy="4114800"/>
+            <a:off x="702310" y="4421823"/>
+            <a:ext cx="5618480" cy="4189095"/>
           </a:xfrm>
           <a:prstGeom prst="rect">
             <a:avLst/>
           </a:prstGeom>
         </p:spPr>
         <p:txBody>
-          <a:bodyPr vert="horz" lIns="91440" tIns="45720" rIns="91440" bIns="45720" rtlCol="0"/>
+          <a:bodyPr vert="horz" lIns="93324" tIns="46662" rIns="93324" bIns="46662" rtlCol="0"/>
           <a:lstStyle/>
           <a:p>
             <a:pPr lvl="0"/>
@@ -359,15 +360,15 @@
         </p:nvSpPr>
         <p:spPr>
           <a:xfrm>
-            <a:off x="0" y="8685213"/>
-            <a:ext cx="2971800" cy="457200"/>
+            <a:off x="0" y="8842029"/>
+            <a:ext cx="3043343" cy="465455"/>
           </a:xfrm>
           <a:prstGeom prst="rect">
             <a:avLst/>
           </a:prstGeom>
         </p:spPr>
         <p:txBody>
-          <a:bodyPr vert="horz" lIns="91440" tIns="45720" rIns="91440" bIns="45720" rtlCol="0" anchor="b"/>
+          <a:bodyPr vert="horz" lIns="93324" tIns="46662" rIns="93324" bIns="46662" rtlCol="0" anchor="b"/>
           <a:lstStyle>
             <a:lvl1pPr algn="l">
               <a:defRPr sz="1200"/>
@@ -390,15 +391,15 @@
         </p:nvSpPr>
         <p:spPr>
           <a:xfrm>
-            <a:off x="3884613" y="8685213"/>
-            <a:ext cx="2971800" cy="457200"/>
+            <a:off x="3978132" y="8842029"/>
+            <a:ext cx="3043343" cy="465455"/>
           </a:xfrm>
           <a:prstGeom prst="rect">
             <a:avLst/>
           </a:prstGeom>
         </p:spPr>
         <p:txBody>
-          <a:bodyPr vert="horz" lIns="91440" tIns="45720" rIns="91440" bIns="45720" rtlCol="0" anchor="b"/>
+          <a:bodyPr vert="horz" lIns="93324" tIns="46662" rIns="93324" bIns="46662" rtlCol="0" anchor="b"/>
           <a:lstStyle>
             <a:lvl1pPr algn="r">
               <a:defRPr sz="1200"/>
@@ -560,10 +561,6 @@
           <a:bodyPr/>
           <a:lstStyle/>
           <a:p>
-            <a:pPr marL="0" indent="0">
-              <a:buFontTx/>
-              <a:buNone/>
-            </a:pPr>
             <a:r>
               <a:rPr lang="en-US" dirty="0" smtClean="0"/>
               <a:t>- ARM</a:t>
@@ -574,10 +571,6 @@
             </a:r>
           </a:p>
           <a:p>
-            <a:pPr marL="0" indent="0">
-              <a:buFontTx/>
-              <a:buNone/>
-            </a:pPr>
             <a:r>
               <a:rPr lang="en-US" dirty="0" smtClean="0"/>
               <a:t>- High Performance != Real</a:t>
@@ -607,7 +600,7 @@
           <a:p>
             <a:fld id="{A4701F91-29EB-40D2-B9D7-8C42FB260373}" type="datetime1">
               <a:rPr lang="en-US" smtClean="0"/>
-              <a:t>11/6/2014</a:t>
+              <a:t>11/7/2014</a:t>
             </a:fld>
             <a:endParaRPr lang="en-US" dirty="0"/>
           </a:p>
@@ -721,29 +714,13 @@
           </a:p>
           <a:p>
             <a:r>
-              <a:rPr lang="en-US" sz="1200" kern="1200" dirty="0" smtClean="0">
-                <a:solidFill>
-                  <a:schemeClr val="tx1"/>
-                </a:solidFill>
-                <a:effectLst/>
-                <a:latin typeface="+mn-lt"/>
-                <a:ea typeface="+mn-ea"/>
-                <a:cs typeface="+mn-cs"/>
-              </a:rPr>
+              <a:rPr lang="en-US" dirty="0"/>
               <a:t>The industrial ethernet peripheral (IEP) is intended to do the hardware work required for industrial ethernet</a:t>
             </a:r>
           </a:p>
           <a:p>
             <a:r>
-              <a:rPr lang="en-US" sz="1200" kern="1200" dirty="0" smtClean="0">
-                <a:solidFill>
-                  <a:schemeClr val="tx1"/>
-                </a:solidFill>
-                <a:effectLst/>
-                <a:latin typeface="+mn-lt"/>
-                <a:ea typeface="+mn-ea"/>
-                <a:cs typeface="+mn-cs"/>
-              </a:rPr>
+              <a:rPr lang="en-US" dirty="0"/>
               <a:t>functions. The IEP module features an industrial ethernet timer with eight compare events</a:t>
             </a:r>
           </a:p>
@@ -853,7 +830,7 @@
           <a:p>
             <a:fld id="{51E15663-ABC3-4907-8BC5-ADC9FA984BB7}" type="datetime1">
               <a:rPr lang="en-US" smtClean="0"/>
-              <a:t>11/6/2014</a:t>
+              <a:t>11/7/2014</a:t>
             </a:fld>
             <a:endParaRPr lang="en-US" dirty="0"/>
           </a:p>
@@ -923,8 +900,8 @@
         </p:nvSpPr>
         <p:spPr bwMode="auto">
           <a:xfrm>
-            <a:off x="3885903" y="8687405"/>
-            <a:ext cx="2972097" cy="456595"/>
+            <a:off x="3979453" y="8844261"/>
+            <a:ext cx="3043647" cy="464839"/>
           </a:xfrm>
           <a:prstGeom prst="rect">
             <a:avLst/>
@@ -954,7 +931,7 @@
           </a:extLst>
         </p:spPr>
         <p:txBody>
-          <a:bodyPr lIns="91177" tIns="45589" rIns="91177" bIns="45589" anchor="b"/>
+          <a:bodyPr lIns="93055" tIns="46528" rIns="93055" bIns="46528" anchor="b"/>
           <a:lstStyle>
             <a:lvl1pPr defTabSz="963613" eaLnBrk="0" hangingPunct="0">
               <a:defRPr>
@@ -1078,8 +1055,8 @@
         </p:nvSpPr>
         <p:spPr bwMode="auto">
           <a:xfrm>
-            <a:off x="3884414" y="8685894"/>
-            <a:ext cx="2972098" cy="456595"/>
+            <a:off x="3977927" y="8842723"/>
+            <a:ext cx="3043649" cy="464839"/>
           </a:xfrm>
           <a:prstGeom prst="rect">
             <a:avLst/>
@@ -1109,7 +1086,7 @@
           </a:extLst>
         </p:spPr>
         <p:txBody>
-          <a:bodyPr lIns="91427" tIns="45714" rIns="91427" bIns="45714" anchor="b"/>
+          <a:bodyPr lIns="93310" tIns="46656" rIns="93310" bIns="46656" anchor="b"/>
           <a:lstStyle>
             <a:lvl1pPr defTabSz="966788" eaLnBrk="0" hangingPunct="0">
               <a:defRPr>
@@ -1235,8 +1212,8 @@
         </p:nvSpPr>
         <p:spPr>
           <a:xfrm>
-            <a:off x="1144588" y="687388"/>
-            <a:ext cx="4568825" cy="3427412"/>
+            <a:off x="1185863" y="700088"/>
+            <a:ext cx="4651375" cy="3489325"/>
           </a:xfrm>
           <a:ln/>
         </p:spPr>
@@ -1253,13 +1230,13 @@
         </p:nvSpPr>
         <p:spPr>
           <a:xfrm>
-            <a:off x="916781" y="4342191"/>
-            <a:ext cx="5024438" cy="4113893"/>
+            <a:off x="938852" y="4420592"/>
+            <a:ext cx="5145397" cy="4188172"/>
           </a:xfrm>
           <a:noFill/>
         </p:spPr>
         <p:txBody>
-          <a:bodyPr lIns="91427" tIns="45714" rIns="91427" bIns="45714"/>
+          <a:bodyPr lIns="93310" tIns="46656" rIns="93310" bIns="46656"/>
           <a:lstStyle/>
           <a:p>
             <a:pPr eaLnBrk="1" hangingPunct="1">
@@ -1954,73 +1931,25 @@
           </a:p>
           <a:p>
             <a:r>
-              <a:rPr lang="en-US" sz="1200" b="1" kern="1200" dirty="0" smtClean="0">
-                <a:solidFill>
-                  <a:schemeClr val="tx1"/>
-                </a:solidFill>
-                <a:effectLst/>
-                <a:latin typeface="+mn-lt"/>
-                <a:ea typeface="+mn-ea"/>
-                <a:cs typeface="+mn-cs"/>
-              </a:rPr>
+              <a:rPr lang="en-US" b="1" dirty="0"/>
               <a:t>The PRU enhanced GPIO are much faster as the PRU does access the pin directly.</a:t>
             </a:r>
             <a:br>
-              <a:rPr lang="en-US" sz="1200" b="1" kern="1200" dirty="0" smtClean="0">
-                <a:solidFill>
-                  <a:schemeClr val="tx1"/>
-                </a:solidFill>
-                <a:effectLst/>
-                <a:latin typeface="+mn-lt"/>
-                <a:ea typeface="+mn-ea"/>
-                <a:cs typeface="+mn-cs"/>
-              </a:rPr>
+              <a:rPr lang="en-US" b="1" dirty="0"/>
             </a:br>
             <a:r>
-              <a:rPr lang="en-US" sz="1200" b="1" kern="1200" dirty="0" smtClean="0">
-                <a:solidFill>
-                  <a:schemeClr val="tx1"/>
-                </a:solidFill>
-                <a:effectLst/>
-                <a:latin typeface="+mn-lt"/>
-                <a:ea typeface="+mn-ea"/>
-                <a:cs typeface="+mn-cs"/>
-              </a:rPr>
+              <a:rPr lang="en-US" b="1" dirty="0"/>
               <a:t>We physically use the same physical pins but used a different pinmux option.</a:t>
             </a:r>
             <a:br>
-              <a:rPr lang="en-US" sz="1200" b="1" kern="1200" dirty="0" smtClean="0">
-                <a:solidFill>
-                  <a:schemeClr val="tx1"/>
-                </a:solidFill>
-                <a:effectLst/>
-                <a:latin typeface="+mn-lt"/>
-                <a:ea typeface="+mn-ea"/>
-                <a:cs typeface="+mn-cs"/>
-              </a:rPr>
+              <a:rPr lang="en-US" b="1" dirty="0"/>
             </a:br>
             <a:r>
-              <a:rPr lang="en-US" sz="1200" b="1" kern="1200" dirty="0" smtClean="0">
-                <a:solidFill>
-                  <a:schemeClr val="tx1"/>
-                </a:solidFill>
-                <a:effectLst/>
-                <a:latin typeface="+mn-lt"/>
-                <a:ea typeface="+mn-ea"/>
-                <a:cs typeface="+mn-cs"/>
-              </a:rPr>
+              <a:rPr lang="en-US" b="1" dirty="0"/>
               <a:t>The below picture show the differences between the two setup:</a:t>
             </a:r>
             <a:br>
-              <a:rPr lang="en-US" sz="1200" b="1" kern="1200" dirty="0" smtClean="0">
-                <a:solidFill>
-                  <a:schemeClr val="tx1"/>
-                </a:solidFill>
-                <a:effectLst/>
-                <a:latin typeface="+mn-lt"/>
-                <a:ea typeface="+mn-ea"/>
-                <a:cs typeface="+mn-cs"/>
-              </a:rPr>
+              <a:rPr lang="en-US" b="1" dirty="0"/>
             </a:br>
             <a:endParaRPr lang="en-US" dirty="0" smtClean="0"/>
           </a:p>
@@ -2050,7 +1979,7 @@
           <a:p>
             <a:fld id="{A2E0F6EB-8074-47DC-B3A3-4A9DB8A85AA3}" type="datetime1">
               <a:rPr lang="en-US" smtClean="0"/>
-              <a:t>11/6/2014</a:t>
+              <a:t>11/7/2014</a:t>
             </a:fld>
             <a:endParaRPr lang="en-US" dirty="0"/>
           </a:p>
@@ -2158,7 +2087,7 @@
           <a:p>
             <a:fld id="{12E0C451-B760-44FC-ABFA-E0ADABCAE2A2}" type="datetime1">
               <a:rPr lang="en-US" smtClean="0"/>
-              <a:t>11/6/2014</a:t>
+              <a:t>11/7/2014</a:t>
             </a:fld>
             <a:endParaRPr lang="en-US" dirty="0"/>
           </a:p>
@@ -2246,30 +2175,15 @@
           <a:lstStyle/>
           <a:p>
             <a:r>
-              <a:rPr lang="en-US" sz="1200" kern="1200" dirty="0" smtClean="0">
-                <a:solidFill>
-                  <a:schemeClr val="tx1"/>
-                </a:solidFill>
-                <a:latin typeface="+mn-lt"/>
-                <a:ea typeface="+mn-ea"/>
-                <a:cs typeface="+mn-cs"/>
-              </a:rPr>
+              <a:rPr lang="en-US" dirty="0"/>
               <a:t>/* Clear SYSCFG[STANDBY_INIT] to enable OCP master port */</a:t>
             </a:r>
           </a:p>
           <a:p>
             <a:r>
-              <a:rPr lang="en-US" sz="1200" kern="1200" dirty="0" smtClean="0">
-                <a:solidFill>
-                  <a:schemeClr val="tx1"/>
-                </a:solidFill>
-                <a:latin typeface="+mn-lt"/>
-                <a:ea typeface="+mn-ea"/>
-                <a:cs typeface="+mn-cs"/>
-              </a:rPr>
+              <a:rPr lang="en-US" dirty="0"/>
               <a:t>CT_CFG.SYSCFG_bit.STANDBY_INIT = 0;</a:t>
             </a:r>
-            <a:endParaRPr lang="en-US" dirty="0"/>
           </a:p>
         </p:txBody>
       </p:sp>
@@ -2390,7 +2304,7 @@
           <a:p>
             <a:fld id="{44180B62-1E4E-4603-B1AA-ED4D2BC6A1E5}" type="datetime1">
               <a:rPr lang="en-US" smtClean="0"/>
-              <a:t>11/6/2014</a:t>
+              <a:t>11/7/2014</a:t>
             </a:fld>
             <a:endParaRPr lang="en-US" dirty="0"/>
           </a:p>
@@ -2706,7 +2620,7 @@
           <a:bodyPr/>
           <a:lstStyle/>
           <a:p>
-            <a:pPr marL="171450" indent="-171450">
+            <a:pPr marL="174982" indent="-174982">
               <a:buFontTx/>
               <a:buChar char="-"/>
             </a:pPr>
@@ -2716,7 +2630,7 @@
             </a:r>
           </a:p>
           <a:p>
-            <a:pPr marL="171450" indent="-171450">
+            <a:pPr marL="174982" indent="-174982">
               <a:buFontTx/>
               <a:buChar char="-"/>
             </a:pPr>
@@ -2731,10 +2645,6 @@
             <a:endParaRPr lang="en-US" dirty="0" smtClean="0"/>
           </a:p>
           <a:p>
-            <a:pPr marL="0" indent="0">
-              <a:buFontTx/>
-              <a:buNone/>
-            </a:pPr>
             <a:r>
               <a:rPr lang="en-US" dirty="0" smtClean="0"/>
               <a:t>-  </a:t>
@@ -2746,7 +2656,7 @@
             <a:endParaRPr lang="en-US" dirty="0" smtClean="0"/>
           </a:p>
           <a:p>
-            <a:pPr marL="171450" indent="-171450">
+            <a:pPr marL="174982" indent="-174982">
               <a:buFontTx/>
               <a:buChar char="-"/>
             </a:pPr>
@@ -2771,7 +2681,7 @@
           <a:p>
             <a:fld id="{A4701F91-29EB-40D2-B9D7-8C42FB260373}" type="datetime1">
               <a:rPr lang="en-US" smtClean="0"/>
-              <a:t>11/6/2014</a:t>
+              <a:t>11/7/2014</a:t>
             </a:fld>
             <a:endParaRPr lang="en-US" dirty="0"/>
           </a:p>
@@ -2807,6 +2717,90 @@
         <p14:creationId xmlns:p14="http://schemas.microsoft.com/office/powerpoint/2010/main" val="128245134"/>
       </p:ext>
     </p:extLst>
+  </p:cSld>
+  <p:clrMapOvr>
+    <a:masterClrMapping/>
+  </p:clrMapOvr>
+</p:notes>
+</file>
+
+<file path=ppt/notesSlides/notesSlide20.xml><?xml version="1.0" encoding="utf-8"?>
+<p:notes xmlns:a="http://schemas.openxmlformats.org/drawingml/2006/main" xmlns:r="http://schemas.openxmlformats.org/officeDocument/2006/relationships" xmlns:p="http://schemas.openxmlformats.org/presentationml/2006/main">
+  <p:cSld>
+    <p:spTree>
+      <p:nvGrpSpPr>
+        <p:cNvPr id="1" name=""/>
+        <p:cNvGrpSpPr/>
+        <p:nvPr/>
+      </p:nvGrpSpPr>
+      <p:grpSpPr>
+        <a:xfrm>
+          <a:off x="0" y="0"/>
+          <a:ext cx="0" cy="0"/>
+          <a:chOff x="0" y="0"/>
+          <a:chExt cx="0" cy="0"/>
+        </a:xfrm>
+      </p:grpSpPr>
+      <p:sp>
+        <p:nvSpPr>
+          <p:cNvPr id="7" name="Rectangle 7"/>
+          <p:cNvSpPr>
+            <a:spLocks noGrp="1" noChangeArrowheads="1"/>
+          </p:cNvSpPr>
+          <p:nvPr>
+            <p:ph type="sldNum" sz="quarter" idx="5"/>
+          </p:nvPr>
+        </p:nvSpPr>
+        <p:spPr>
+          <a:ln/>
+        </p:spPr>
+        <p:txBody>
+          <a:bodyPr/>
+          <a:lstStyle/>
+          <a:p>
+            <a:fld id="{59EAE9B4-13B3-4257-B5DB-68F933689ECC}" type="slidenum">
+              <a:rPr lang="en-US"/>
+              <a:pPr/>
+              <a:t>58</a:t>
+            </a:fld>
+            <a:endParaRPr lang="en-US" dirty="0"/>
+          </a:p>
+        </p:txBody>
+      </p:sp>
+      <p:sp>
+        <p:nvSpPr>
+          <p:cNvPr id="80898" name="Rectangle 2"/>
+          <p:cNvSpPr>
+            <a:spLocks noGrp="1" noRot="1" noChangeAspect="1" noChangeArrowheads="1" noTextEdit="1"/>
+          </p:cNvSpPr>
+          <p:nvPr>
+            <p:ph type="sldImg"/>
+          </p:nvPr>
+        </p:nvSpPr>
+        <p:spPr>
+          <a:ln/>
+        </p:spPr>
+      </p:sp>
+      <p:sp>
+        <p:nvSpPr>
+          <p:cNvPr id="80899" name="Rectangle 3"/>
+          <p:cNvSpPr>
+            <a:spLocks noGrp="1" noChangeArrowheads="1"/>
+          </p:cNvSpPr>
+          <p:nvPr>
+            <p:ph type="body" idx="1"/>
+          </p:nvPr>
+        </p:nvSpPr>
+        <p:spPr/>
+        <p:txBody>
+          <a:bodyPr/>
+          <a:lstStyle/>
+          <a:p>
+            <a:endParaRPr lang="en-US" dirty="0"/>
+          </a:p>
+        </p:txBody>
+      </p:sp>
+    </p:spTree>
   </p:cSld>
   <p:clrMapOvr>
     <a:masterClrMapping/>
@@ -2902,7 +2896,7 @@
               </a:lnSpc>
             </a:pPr>
             <a:r>
-              <a:rPr lang="en-US" sz="1600" dirty="0" smtClean="0"/>
+              <a:rPr lang="en-US" sz="1600" dirty="0"/>
               <a:t>AM335x:</a:t>
             </a:r>
           </a:p>
@@ -2913,7 +2907,7 @@
               </a:lnSpc>
             </a:pPr>
             <a:r>
-              <a:rPr lang="en-US" sz="1600" dirty="0" smtClean="0"/>
+              <a:rPr lang="en-US" sz="1600" dirty="0"/>
               <a:t>- 8K Byte instruction RAM   (2K instructions) per core</a:t>
             </a:r>
           </a:p>
@@ -2924,7 +2918,7 @@
               </a:lnSpc>
             </a:pPr>
             <a:r>
-              <a:rPr lang="en-US" sz="1600" dirty="0" smtClean="0"/>
+              <a:rPr lang="en-US" sz="1600" dirty="0"/>
               <a:t>- 8K Bytes data RAM per core</a:t>
             </a:r>
           </a:p>
@@ -2935,7 +2929,7 @@
               </a:lnSpc>
             </a:pPr>
             <a:r>
-              <a:rPr lang="en-US" sz="1600" dirty="0" smtClean="0"/>
+              <a:rPr lang="en-US" sz="1600" dirty="0"/>
               <a:t>- 12K Bytes shared RAM</a:t>
             </a:r>
           </a:p>
@@ -3238,7 +3232,7 @@
               </a:lnSpc>
             </a:pPr>
             <a:r>
-              <a:rPr lang="en-US" sz="1600" dirty="0" smtClean="0"/>
+              <a:rPr lang="en-US" sz="1600" dirty="0"/>
               <a:t>AM335x:</a:t>
             </a:r>
           </a:p>
@@ -3249,7 +3243,7 @@
               </a:lnSpc>
             </a:pPr>
             <a:r>
-              <a:rPr lang="en-US" sz="1600" dirty="0" smtClean="0"/>
+              <a:rPr lang="en-US" sz="1600" dirty="0"/>
               <a:t>- 8K Byte instruction RAM   (2K instructions) per core</a:t>
             </a:r>
           </a:p>
@@ -3260,7 +3254,7 @@
               </a:lnSpc>
             </a:pPr>
             <a:r>
-              <a:rPr lang="en-US" sz="1600" dirty="0" smtClean="0"/>
+              <a:rPr lang="en-US" sz="1600" dirty="0"/>
               <a:t>- 8K Bytes data RAM per core</a:t>
             </a:r>
           </a:p>
@@ -3271,7 +3265,7 @@
               </a:lnSpc>
             </a:pPr>
             <a:r>
-              <a:rPr lang="en-US" sz="1600" dirty="0" smtClean="0"/>
+              <a:rPr lang="en-US" sz="1600" dirty="0"/>
               <a:t>- 12K Bytes shared RAM</a:t>
             </a:r>
           </a:p>
@@ -4094,7 +4088,7 @@
           <a:p>
             <a:fld id="{7B8A4E2A-EC1C-49F2-86AD-0AF2DCEAA54C}" type="datetimeFigureOut">
               <a:rPr lang="en-US" smtClean="0"/>
-              <a:t>11/6/2014</a:t>
+              <a:t>11/7/2014</a:t>
             </a:fld>
             <a:endParaRPr lang="en-US" dirty="0"/>
           </a:p>
@@ -4264,7 +4258,7 @@
           <a:p>
             <a:fld id="{7B8A4E2A-EC1C-49F2-86AD-0AF2DCEAA54C}" type="datetimeFigureOut">
               <a:rPr lang="en-US" smtClean="0"/>
-              <a:t>11/6/2014</a:t>
+              <a:t>11/7/2014</a:t>
             </a:fld>
             <a:endParaRPr lang="en-US" dirty="0"/>
           </a:p>
@@ -4444,7 +4438,7 @@
           <a:p>
             <a:fld id="{7B8A4E2A-EC1C-49F2-86AD-0AF2DCEAA54C}" type="datetimeFigureOut">
               <a:rPr lang="en-US" smtClean="0"/>
-              <a:t>11/6/2014</a:t>
+              <a:t>11/7/2014</a:t>
             </a:fld>
             <a:endParaRPr lang="en-US" dirty="0"/>
           </a:p>
@@ -4614,7 +4608,7 @@
           <a:p>
             <a:fld id="{7B8A4E2A-EC1C-49F2-86AD-0AF2DCEAA54C}" type="datetimeFigureOut">
               <a:rPr lang="en-US" smtClean="0"/>
-              <a:t>11/6/2014</a:t>
+              <a:t>11/7/2014</a:t>
             </a:fld>
             <a:endParaRPr lang="en-US" dirty="0"/>
           </a:p>
@@ -4860,7 +4854,7 @@
           <a:p>
             <a:fld id="{7B8A4E2A-EC1C-49F2-86AD-0AF2DCEAA54C}" type="datetimeFigureOut">
               <a:rPr lang="en-US" smtClean="0"/>
-              <a:t>11/6/2014</a:t>
+              <a:t>11/7/2014</a:t>
             </a:fld>
             <a:endParaRPr lang="en-US" dirty="0"/>
           </a:p>
@@ -5148,7 +5142,7 @@
           <a:p>
             <a:fld id="{7B8A4E2A-EC1C-49F2-86AD-0AF2DCEAA54C}" type="datetimeFigureOut">
               <a:rPr lang="en-US" smtClean="0"/>
-              <a:t>11/6/2014</a:t>
+              <a:t>11/7/2014</a:t>
             </a:fld>
             <a:endParaRPr lang="en-US" dirty="0"/>
           </a:p>
@@ -5570,7 +5564,7 @@
           <a:p>
             <a:fld id="{7B8A4E2A-EC1C-49F2-86AD-0AF2DCEAA54C}" type="datetimeFigureOut">
               <a:rPr lang="en-US" smtClean="0"/>
-              <a:t>11/6/2014</a:t>
+              <a:t>11/7/2014</a:t>
             </a:fld>
             <a:endParaRPr lang="en-US" dirty="0"/>
           </a:p>
@@ -5688,7 +5682,7 @@
           <a:p>
             <a:fld id="{7B8A4E2A-EC1C-49F2-86AD-0AF2DCEAA54C}" type="datetimeFigureOut">
               <a:rPr lang="en-US" smtClean="0"/>
-              <a:t>11/6/2014</a:t>
+              <a:t>11/7/2014</a:t>
             </a:fld>
             <a:endParaRPr lang="en-US" dirty="0"/>
           </a:p>
@@ -5783,7 +5777,7 @@
           <a:p>
             <a:fld id="{7B8A4E2A-EC1C-49F2-86AD-0AF2DCEAA54C}" type="datetimeFigureOut">
               <a:rPr lang="en-US" smtClean="0"/>
-              <a:t>11/6/2014</a:t>
+              <a:t>11/7/2014</a:t>
             </a:fld>
             <a:endParaRPr lang="en-US" dirty="0"/>
           </a:p>
@@ -6060,7 +6054,7 @@
           <a:p>
             <a:fld id="{7B8A4E2A-EC1C-49F2-86AD-0AF2DCEAA54C}" type="datetimeFigureOut">
               <a:rPr lang="en-US" smtClean="0"/>
-              <a:t>11/6/2014</a:t>
+              <a:t>11/7/2014</a:t>
             </a:fld>
             <a:endParaRPr lang="en-US" dirty="0"/>
           </a:p>
@@ -6313,7 +6307,7 @@
           <a:p>
             <a:fld id="{7B8A4E2A-EC1C-49F2-86AD-0AF2DCEAA54C}" type="datetimeFigureOut">
               <a:rPr lang="en-US" smtClean="0"/>
-              <a:t>11/6/2014</a:t>
+              <a:t>11/7/2014</a:t>
             </a:fld>
             <a:endParaRPr lang="en-US" dirty="0"/>
           </a:p>
@@ -6526,7 +6520,7 @@
           <a:p>
             <a:fld id="{7B8A4E2A-EC1C-49F2-86AD-0AF2DCEAA54C}" type="datetimeFigureOut">
               <a:rPr lang="en-US" smtClean="0"/>
-              <a:t>11/6/2014</a:t>
+              <a:t>11/7/2014</a:t>
             </a:fld>
             <a:endParaRPr lang="en-US" dirty="0"/>
           </a:p>
@@ -6921,7 +6915,6 @@
               <a:rPr lang="en-US" dirty="0" smtClean="0"/>
               <a:t>PRU Overview</a:t>
             </a:r>
-            <a:endParaRPr lang="en-US" dirty="0" smtClean="0"/>
           </a:p>
         </p:txBody>
       </p:sp>
@@ -7087,11 +7080,11 @@
   <p:clrMapOvr>
     <a:masterClrMapping/>
   </p:clrMapOvr>
-  <mc:AlternateContent xmlns:mc="http://schemas.openxmlformats.org/markup-compatibility/2006">
-    <mc:Choice xmlns:p14="http://schemas.microsoft.com/office/powerpoint/2010/main" Requires="p14">
+  <mc:AlternateContent xmlns:mc="http://schemas.openxmlformats.org/markup-compatibility/2006" xmlns:p14="http://schemas.microsoft.com/office/powerpoint/2010/main">
+    <mc:Choice Requires="p14">
       <p:transition spd="slow" p14:dur="2000"/>
     </mc:Choice>
-    <mc:Fallback>
+    <mc:Fallback xmlns="">
       <p:transition spd="slow"/>
     </mc:Fallback>
   </mc:AlternateContent>
@@ -7666,7 +7659,7 @@
 </file>
 
 <file path=ppt/slides/slide15.xml><?xml version="1.0" encoding="utf-8"?>
-<p:sld xmlns:a="http://schemas.openxmlformats.org/drawingml/2006/main" xmlns:r="http://schemas.openxmlformats.org/officeDocument/2006/relationships" xmlns:p="http://schemas.openxmlformats.org/presentationml/2006/main" show="0">
+<p:sld xmlns:a="http://schemas.openxmlformats.org/drawingml/2006/main" xmlns:r="http://schemas.openxmlformats.org/officeDocument/2006/relationships" xmlns:p="http://schemas.openxmlformats.org/presentationml/2006/main">
   <p:cSld>
     <p:spTree>
       <p:nvGrpSpPr>
@@ -15704,15 +15697,7 @@
           <a:p>
             <a:r>
               <a:rPr lang="en-US" dirty="0" smtClean="0"/>
-              <a:t>Each PRU sees his </a:t>
-            </a:r>
-            <a:r>
-              <a:rPr lang="en-US" dirty="0" smtClean="0"/>
-              <a:t>RAM </a:t>
-            </a:r>
-            <a:r>
-              <a:rPr lang="en-US" dirty="0" smtClean="0"/>
-              <a:t>at 0x000 0000 and the other one at 0x0000 2000</a:t>
+              <a:t>Each PRU sees his RAM at 0x000 0000 and the other one at 0x0000 2000</a:t>
             </a:r>
             <a:endParaRPr lang="en-US" dirty="0"/>
           </a:p>
@@ -22986,7 +22971,7 @@
         <p:spPr bwMode="auto">
           <a:xfrm>
             <a:off x="4050083" y="4451350"/>
-            <a:ext cx="4763717" cy="1695849"/>
+            <a:ext cx="4763717" cy="1692771"/>
           </a:xfrm>
           <a:prstGeom prst="rect">
             <a:avLst/>
@@ -23153,23 +23138,20 @@
               <a:t>Easily adapt to changing standards or </a:t>
             </a:r>
             <a:r>
-              <a:rPr lang="en-US" sz="1200" b="1" dirty="0">
+              <a:rPr lang="en-US" sz="1200" b="1" dirty="0" smtClean="0">
                 <a:solidFill>
                   <a:srgbClr val="DE0000"/>
                 </a:solidFill>
                 <a:latin typeface="Arial"/>
               </a:rPr>
-              <a:t>create own </a:t>
-            </a:r>
-            <a:r>
-              <a:rPr lang="en-US" sz="1200" dirty="0">
-                <a:solidFill>
-                  <a:srgbClr val="000000"/>
-                </a:solidFill>
-                <a:latin typeface="Arial"/>
-              </a:rPr>
-              <a:t>(requires PRU expertise or 3P help)</a:t>
-            </a:r>
+              <a:t>create</a:t>
+            </a:r>
+            <a:endParaRPr lang="en-US" sz="1200" dirty="0">
+              <a:solidFill>
+                <a:srgbClr val="000000"/>
+              </a:solidFill>
+              <a:latin typeface="Arial"/>
+            </a:endParaRPr>
           </a:p>
           <a:p>
             <a:pPr marL="114300" lvl="1" indent="-114300" defTabSz="622300">
@@ -23189,7 +23171,25 @@
                 </a:solidFill>
                 <a:latin typeface="Arial"/>
               </a:rPr>
-              <a:t>Scalable solution for HMI, PLC and I/O </a:t>
+              <a:t>Scalable solution for </a:t>
+            </a:r>
+            <a:r>
+              <a:rPr lang="en-US" sz="1200" dirty="0" smtClean="0">
+                <a:solidFill>
+                  <a:srgbClr val="000000"/>
+                </a:solidFill>
+                <a:latin typeface="Arial"/>
+              </a:rPr>
+              <a:t>Human Machine Interface,  Programmable Logic Control </a:t>
+            </a:r>
+            <a:r>
+              <a:rPr lang="en-US" sz="1200" dirty="0">
+                <a:solidFill>
+                  <a:srgbClr val="000000"/>
+                </a:solidFill>
+                <a:latin typeface="Arial"/>
+              </a:rPr>
+              <a:t>and I/O </a:t>
             </a:r>
             <a:r>
               <a:rPr lang="en-US" sz="1200" dirty="0" smtClean="0">
@@ -23949,11 +23949,11 @@
   <p:clrMapOvr>
     <a:masterClrMapping/>
   </p:clrMapOvr>
-  <mc:AlternateContent xmlns:mc="http://schemas.openxmlformats.org/markup-compatibility/2006">
-    <mc:Choice xmlns:p14="http://schemas.microsoft.com/office/powerpoint/2010/main" Requires="p14">
+  <mc:AlternateContent xmlns:mc="http://schemas.openxmlformats.org/markup-compatibility/2006" xmlns:p14="http://schemas.microsoft.com/office/powerpoint/2010/main">
+    <mc:Choice Requires="p14">
       <p:transition spd="slow" p14:dur="2000"/>
     </mc:Choice>
-    <mc:Fallback>
+    <mc:Fallback xmlns="">
       <p:transition spd="slow"/>
     </mc:Fallback>
   </mc:AlternateContent>
@@ -24166,11 +24166,6 @@
               </a:rPr>
               <a:t>Bit-Byte Support</a:t>
             </a:r>
-            <a:endParaRPr lang="en-US" sz="3200" dirty="0" smtClean="0">
-              <a:solidFill>
-                <a:srgbClr val="FF0000"/>
-              </a:solidFill>
-            </a:endParaRPr>
           </a:p>
           <a:p>
             <a:pPr algn="ctr"/>
@@ -24201,7 +24196,7 @@
         </p:blipFill>
         <p:spPr bwMode="auto">
           <a:xfrm>
-            <a:off x="180255" y="3048000"/>
+            <a:off x="145619" y="3048000"/>
             <a:ext cx="8677275" cy="2943225"/>
           </a:xfrm>
           <a:prstGeom prst="rect">
@@ -24420,7 +24415,7 @@
 </file>
 
 <file path=ppt/slides/slide39.xml><?xml version="1.0" encoding="utf-8"?>
-<p:sld xmlns:a="http://schemas.openxmlformats.org/drawingml/2006/main" xmlns:r="http://schemas.openxmlformats.org/officeDocument/2006/relationships" xmlns:p="http://schemas.openxmlformats.org/presentationml/2006/main">
+<p:sld xmlns:a="http://schemas.openxmlformats.org/drawingml/2006/main" xmlns:r="http://schemas.openxmlformats.org/officeDocument/2006/relationships" xmlns:p="http://schemas.openxmlformats.org/presentationml/2006/main" show="0">
   <p:cSld>
     <p:spTree>
       <p:nvGrpSpPr>
@@ -24581,6 +24576,14 @@
   <p:clrMapOvr>
     <a:masterClrMapping/>
   </p:clrMapOvr>
+  <mc:AlternateContent xmlns:mc="http://schemas.openxmlformats.org/markup-compatibility/2006" xmlns:p14="http://schemas.microsoft.com/office/powerpoint/2010/main">
+    <mc:Choice Requires="p14">
+      <p:transition spd="slow" p14:dur="2000"/>
+    </mc:Choice>
+    <mc:Fallback xmlns="">
+      <p:transition spd="slow"/>
+    </mc:Fallback>
+  </mc:AlternateContent>
   <p:timing>
     <p:tnLst>
       <p:par>
@@ -27493,7 +27496,7 @@
             </a:pPr>
             <a:r>
               <a:rPr lang="en-US" sz="2800" dirty="0" smtClean="0"/>
-              <a:t>All development is done from IDE (CCS)</a:t>
+              <a:t>All development can be done from IDE (CCS)</a:t>
             </a:r>
             <a:endParaRPr lang="en-US" sz="2000" dirty="0" smtClean="0"/>
           </a:p>
@@ -27787,63 +27790,6 @@
       </p:grpSpPr>
       <p:sp>
         <p:nvSpPr>
-          <p:cNvPr id="8" name="Rectangle 7"/>
-          <p:cNvSpPr/>
-          <p:nvPr/>
-        </p:nvSpPr>
-        <p:spPr>
-          <a:xfrm>
-            <a:off x="550609" y="5036726"/>
-            <a:ext cx="7924800" cy="1042219"/>
-          </a:xfrm>
-          <a:prstGeom prst="rect">
-            <a:avLst/>
-          </a:prstGeom>
-          <a:solidFill>
-            <a:srgbClr val="FFFF00"/>
-          </a:solidFill>
-          <a:ln>
-            <a:noFill/>
-          </a:ln>
-        </p:spPr>
-        <p:style>
-          <a:lnRef idx="2">
-            <a:schemeClr val="accent1">
-              <a:shade val="50000"/>
-            </a:schemeClr>
-          </a:lnRef>
-          <a:fillRef idx="1">
-            <a:schemeClr val="accent1"/>
-          </a:fillRef>
-          <a:effectRef idx="0">
-            <a:schemeClr val="accent1"/>
-          </a:effectRef>
-          <a:fontRef idx="minor">
-            <a:schemeClr val="lt1"/>
-          </a:fontRef>
-        </p:style>
-        <p:txBody>
-          <a:bodyPr rtlCol="0" anchor="ctr"/>
-          <a:lstStyle/>
-          <a:p>
-            <a:pPr algn="ctr" fontAlgn="base">
-              <a:spcBef>
-                <a:spcPct val="0"/>
-              </a:spcBef>
-              <a:spcAft>
-                <a:spcPct val="0"/>
-              </a:spcAft>
-            </a:pPr>
-            <a:endParaRPr lang="en-US" dirty="0">
-              <a:solidFill>
-                <a:srgbClr val="FFFFFF"/>
-              </a:solidFill>
-            </a:endParaRPr>
-          </a:p>
-        </p:txBody>
-      </p:sp>
-      <p:sp>
-        <p:nvSpPr>
           <p:cNvPr id="2" name="Title 1"/>
           <p:cNvSpPr>
             <a:spLocks noGrp="1"/>
@@ -27852,16 +27798,23 @@
             <p:ph type="title"/>
           </p:nvPr>
         </p:nvSpPr>
-        <p:spPr/>
+        <p:spPr>
+          <a:xfrm>
+            <a:off x="457200" y="274638"/>
+            <a:ext cx="8229600" cy="868362"/>
+          </a:xfrm>
+        </p:spPr>
         <p:txBody>
-          <a:bodyPr/>
+          <a:bodyPr>
+            <a:normAutofit/>
+          </a:bodyPr>
           <a:lstStyle/>
           <a:p>
             <a:r>
-              <a:rPr lang="fr-FR" dirty="0" smtClean="0"/>
-              <a:t>TI PRU CGT Assembler vs PASM</a:t>
-            </a:r>
-            <a:endParaRPr lang="en-US" dirty="0"/>
+              <a:rPr lang="en-US" sz="3600" dirty="0" smtClean="0"/>
+              <a:t>C Compiler</a:t>
+            </a:r>
+            <a:endParaRPr lang="en-US" sz="3600" dirty="0"/>
           </a:p>
         </p:txBody>
       </p:sp>
@@ -27875,279 +27828,91 @@
             <p:ph idx="1"/>
           </p:nvPr>
         </p:nvSpPr>
-        <p:spPr>
-          <a:xfrm>
-            <a:off x="279146" y="954059"/>
-            <a:ext cx="8467725" cy="5189120"/>
-          </a:xfrm>
-        </p:spPr>
+        <p:spPr/>
         <p:txBody>
           <a:bodyPr>
-            <a:normAutofit fontScale="92500"/>
+            <a:normAutofit/>
           </a:bodyPr>
           <a:lstStyle/>
           <a:p>
-            <a:pPr marL="336550" indent="-342900">
-              <a:buFont typeface="Arial" panose="020B0604020202020204" pitchFamily="34" charset="0"/>
-              <a:buChar char="•"/>
-            </a:pPr>
-            <a:r>
-              <a:rPr lang="en-US" b="1" dirty="0" smtClean="0">
-                <a:solidFill>
-                  <a:srgbClr val="FF0000"/>
-                </a:solidFill>
-              </a:rPr>
-              <a:t>Advantages </a:t>
-            </a:r>
-            <a:r>
-              <a:rPr lang="en-US" b="1" dirty="0">
-                <a:solidFill>
-                  <a:srgbClr val="FF0000"/>
-                </a:solidFill>
-              </a:rPr>
-              <a:t>of using TI PRU Assembler over PASM</a:t>
-            </a:r>
-          </a:p>
-          <a:p>
-            <a:pPr marL="695325" lvl="1" indent="-285750">
+            <a:r>
+              <a:rPr lang="en-US" sz="2600" dirty="0" smtClean="0"/>
+              <a:t>Developed and maintained by TI CGT </a:t>
+            </a:r>
+            <a:r>
+              <a:rPr lang="en-US" dirty="0" smtClean="0"/>
+              <a:t>team</a:t>
+            </a:r>
+          </a:p>
+          <a:p>
+            <a:pPr lvl="1"/>
+            <a:r>
+              <a:rPr lang="en-US" dirty="0" smtClean="0"/>
+              <a:t>Remains very similar to other TI compilers</a:t>
+            </a:r>
+          </a:p>
+          <a:p>
+            <a:r>
+              <a:rPr lang="en-US" sz="2600" dirty="0" smtClean="0"/>
+              <a:t>Full support of C/C++</a:t>
+            </a:r>
+          </a:p>
+          <a:p>
+            <a:pPr marL="227013" lvl="1" indent="-227013">
               <a:spcBef>
-                <a:spcPct val="15000"/>
-              </a:spcBef>
-              <a:buFont typeface="Arial" panose="020B0604020202020204" pitchFamily="34" charset="0"/>
-              <a:buChar char="•"/>
-            </a:pPr>
-            <a:r>
-              <a:rPr lang="en-US" sz="1400" b="1" dirty="0">
-                <a:solidFill>
-                  <a:srgbClr val="000000"/>
-                </a:solidFill>
-              </a:rPr>
-              <a:t>The biggest advantage is that the TI PRU linker produces ELF files that enable source-level debugging within CCS.  No more debugging in disassembly window!!</a:t>
-            </a:r>
-          </a:p>
-          <a:p>
-            <a:pPr marL="695325" lvl="1" indent="-285750">
-              <a:spcBef>
-                <a:spcPct val="15000"/>
-              </a:spcBef>
-              <a:buFont typeface="Arial" panose="020B0604020202020204" pitchFamily="34" charset="0"/>
-              <a:buChar char="•"/>
-            </a:pPr>
-            <a:r>
-              <a:rPr lang="en-US" sz="1400" b="1" dirty="0">
-                <a:solidFill>
-                  <a:srgbClr val="000000"/>
-                </a:solidFill>
-              </a:rPr>
-              <a:t>The TI PRU assembler uses the same shell as other TI compilers.  Customers only need to learn one set of conventions, directives, etc.</a:t>
-            </a:r>
-          </a:p>
-          <a:p>
-            <a:pPr marL="695325" lvl="1" indent="-285750">
-              <a:spcBef>
-                <a:spcPct val="15000"/>
-              </a:spcBef>
-              <a:buFont typeface="Arial" panose="020B0604020202020204" pitchFamily="34" charset="0"/>
-              <a:buChar char="•"/>
-            </a:pPr>
-            <a:r>
-              <a:rPr lang="en-US" sz="1400" b="1" dirty="0">
-                <a:solidFill>
-                  <a:srgbClr val="000000"/>
-                </a:solidFill>
-              </a:rPr>
-              <a:t>TI PRU assembler will be maintained in the future, while PASM will not be updated anymore. </a:t>
-            </a:r>
-          </a:p>
-          <a:p>
-            <a:pPr marL="695325" lvl="1" indent="-285750">
-              <a:spcBef>
-                <a:spcPct val="15000"/>
-              </a:spcBef>
-              <a:buFont typeface="Arial" panose="020B0604020202020204" pitchFamily="34" charset="0"/>
-              <a:buChar char="•"/>
-            </a:pPr>
-            <a:r>
-              <a:rPr lang="en-US" sz="1400" b="1" dirty="0">
-                <a:solidFill>
-                  <a:srgbClr val="000000"/>
-                </a:solidFill>
-              </a:rPr>
-              <a:t>The TI PRU assembler uses the </a:t>
-            </a:r>
-            <a:r>
-              <a:rPr lang="en-US" sz="1400" b="1" dirty="0" smtClean="0">
-                <a:solidFill>
-                  <a:srgbClr val="000000"/>
-                </a:solidFill>
-              </a:rPr>
-              <a:t>powerful </a:t>
-            </a:r>
-            <a:r>
-              <a:rPr lang="en-US" sz="1400" b="1" dirty="0">
-                <a:solidFill>
-                  <a:srgbClr val="000000"/>
-                </a:solidFill>
-              </a:rPr>
-              <a:t>TI linker which allows more flexibility then PASM and facilitates linking PRU programs with host CPU image for runtime loading and symbol sharing.</a:t>
-            </a:r>
-          </a:p>
-          <a:p>
-            <a:pPr lvl="2">
-              <a:spcBef>
-                <a:spcPct val="15000"/>
-              </a:spcBef>
-              <a:buFont typeface="Arial" panose="020B0604020202020204" pitchFamily="34" charset="0"/>
-              <a:buChar char="•"/>
-            </a:pPr>
-            <a:endParaRPr lang="en-US" sz="1400" b="1" dirty="0">
-              <a:solidFill>
-                <a:srgbClr val="000000"/>
-              </a:solidFill>
-            </a:endParaRPr>
-          </a:p>
-          <a:p>
-            <a:pPr marL="336550" indent="-342900">
-              <a:buFont typeface="Arial" panose="020B0604020202020204" pitchFamily="34" charset="0"/>
-              <a:buChar char="•"/>
-            </a:pPr>
-            <a:r>
-              <a:rPr lang="en-US" b="1" dirty="0">
-                <a:solidFill>
-                  <a:srgbClr val="FF0000"/>
-                </a:solidFill>
-              </a:rPr>
-              <a:t>Disadvantages </a:t>
-            </a:r>
-            <a:r>
-              <a:rPr lang="en-US" b="1" dirty="0" smtClean="0">
-                <a:solidFill>
-                  <a:srgbClr val="FF0000"/>
-                </a:solidFill>
-              </a:rPr>
-              <a:t>of </a:t>
-            </a:r>
-            <a:r>
-              <a:rPr lang="en-US" b="1" dirty="0">
-                <a:solidFill>
-                  <a:srgbClr val="FF0000"/>
-                </a:solidFill>
-              </a:rPr>
-              <a:t>using TI PRU Assembler over PASM</a:t>
-            </a:r>
-          </a:p>
-          <a:p>
-            <a:pPr marL="695325" lvl="1" indent="-285750">
-              <a:spcBef>
-                <a:spcPct val="15000"/>
-              </a:spcBef>
-              <a:buFont typeface="Arial" panose="020B0604020202020204" pitchFamily="34" charset="0"/>
-              <a:buChar char="•"/>
-            </a:pPr>
-            <a:r>
-              <a:rPr lang="en-US" sz="1400" b="1" dirty="0">
-                <a:solidFill>
-                  <a:srgbClr val="000000"/>
-                </a:solidFill>
-              </a:rPr>
-              <a:t>Have to learn new directives if already used to PASM</a:t>
-            </a:r>
-          </a:p>
-          <a:p>
-            <a:pPr marL="695325" lvl="1" indent="-285750">
-              <a:spcBef>
-                <a:spcPct val="15000"/>
-              </a:spcBef>
-              <a:buFont typeface="Arial" panose="020B0604020202020204" pitchFamily="34" charset="0"/>
-              <a:buChar char="•"/>
-            </a:pPr>
-            <a:r>
-              <a:rPr lang="en-US" sz="1400" b="1" dirty="0">
-                <a:solidFill>
-                  <a:srgbClr val="000000"/>
-                </a:solidFill>
-              </a:rPr>
-              <a:t>TI PRU assembler requires more command line options and a linker command file</a:t>
-            </a:r>
-            <a:r>
-              <a:rPr lang="en-US" sz="1400" b="1" dirty="0" smtClean="0">
-                <a:solidFill>
-                  <a:srgbClr val="000000"/>
-                </a:solidFill>
-              </a:rPr>
-              <a:t>.</a:t>
-            </a:r>
-          </a:p>
-          <a:p>
-            <a:pPr marL="695325" lvl="1" indent="-285750">
-              <a:spcBef>
-                <a:spcPct val="15000"/>
-              </a:spcBef>
-              <a:buFont typeface="Arial" panose="020B0604020202020204" pitchFamily="34" charset="0"/>
-              <a:buChar char="•"/>
-            </a:pPr>
-            <a:r>
-              <a:rPr lang="en-US" sz="1400" b="1" dirty="0" smtClean="0">
-                <a:solidFill>
-                  <a:srgbClr val="000000"/>
-                </a:solidFill>
-              </a:rPr>
-              <a:t>Some porting effort required for reusing legacy PASM projects.</a:t>
-            </a:r>
-            <a:endParaRPr lang="en-US" sz="1400" b="1" dirty="0">
-              <a:solidFill>
-                <a:srgbClr val="000000"/>
-              </a:solidFill>
-            </a:endParaRPr>
-          </a:p>
-          <a:p>
-            <a:pPr marL="854075" lvl="2" indent="-165100">
-              <a:spcBef>
-                <a:spcPct val="15000"/>
+                <a:spcPts val="800"/>
               </a:spcBef>
               <a:buFontTx/>
               <a:buChar char="•"/>
             </a:pPr>
-            <a:endParaRPr lang="en-US" sz="1400" b="1" dirty="0">
-              <a:solidFill>
-                <a:srgbClr val="000000"/>
-              </a:solidFill>
-            </a:endParaRPr>
-          </a:p>
-          <a:p>
-            <a:pPr marL="341312" lvl="1" indent="0">
-              <a:buSzTx/>
+            <a:r>
+              <a:rPr lang="en-US" sz="2000" dirty="0"/>
+              <a:t>Adds PRU-specific functionality</a:t>
+            </a:r>
+          </a:p>
+          <a:p>
+            <a:pPr lvl="1"/>
+            <a:r>
+              <a:rPr lang="en-US" sz="2600" dirty="0" smtClean="0"/>
+              <a:t>Can take advantage of PRU architectural features automatically</a:t>
+            </a:r>
+          </a:p>
+          <a:p>
+            <a:pPr lvl="1"/>
+            <a:r>
+              <a:rPr lang="en-US" dirty="0"/>
+              <a:t>Contains several </a:t>
+            </a:r>
+            <a:r>
+              <a:rPr lang="en-US" dirty="0" smtClean="0"/>
+              <a:t>intrinsic</a:t>
+            </a:r>
+          </a:p>
+          <a:p>
+            <a:pPr lvl="2"/>
+            <a:r>
+              <a:rPr lang="en-US" dirty="0" smtClean="0"/>
+              <a:t>List can be found in Compiler documentation</a:t>
+            </a:r>
+          </a:p>
+          <a:p>
+            <a:r>
+              <a:rPr lang="en-US" sz="2600" dirty="0" smtClean="0"/>
+              <a:t>Full instruction-set Assembler for hand-tuned routines </a:t>
+            </a:r>
+          </a:p>
+          <a:p>
+            <a:pPr marL="0" indent="0">
               <a:buNone/>
             </a:pPr>
-            <a:r>
-              <a:rPr lang="en-US" sz="1800" dirty="0">
-                <a:solidFill>
-                  <a:srgbClr val="000000"/>
-                </a:solidFill>
-              </a:rPr>
-              <a:t>There are some differences in the instructions and directives supported TI PRU Assembler versus PASM.  Theses are listed in the TI PRU Compiler package release notes which is located at the root of the install folder.</a:t>
-            </a:r>
-          </a:p>
-          <a:p>
-            <a:pPr marL="854075" lvl="2" indent="-165100">
-              <a:spcBef>
-                <a:spcPct val="15000"/>
-              </a:spcBef>
-              <a:buFontTx/>
-              <a:buChar char="•"/>
-            </a:pPr>
-            <a:endParaRPr lang="en-US" sz="1600" b="1" dirty="0">
-              <a:solidFill>
-                <a:srgbClr val="000000"/>
-              </a:solidFill>
-            </a:endParaRPr>
+            <a:endParaRPr lang="en-US" dirty="0" smtClean="0"/>
           </a:p>
         </p:txBody>
       </p:sp>
     </p:spTree>
     <p:extLst>
       <p:ext uri="{BB962C8B-B14F-4D97-AF65-F5344CB8AC3E}">
-        <p14:creationId xmlns:p14="http://schemas.microsoft.com/office/powerpoint/2010/main" val="859814791"/>
+        <p14:creationId xmlns:p14="http://schemas.microsoft.com/office/powerpoint/2010/main" val="2110903211"/>
       </p:ext>
     </p:extLst>
   </p:cSld>
@@ -28198,7 +27963,7 @@
           <a:p>
             <a:r>
               <a:rPr lang="en-US" dirty="0" smtClean="0"/>
-              <a:t>C Compiler</a:t>
+              <a:t>Coding Considerations</a:t>
             </a:r>
             <a:endParaRPr lang="en-US" dirty="0"/>
           </a:p>
@@ -28216,94 +27981,63 @@
         </p:nvSpPr>
         <p:spPr/>
         <p:txBody>
-          <a:bodyPr>
-            <a:normAutofit fontScale="92500" lnSpcReduction="10000"/>
-          </a:bodyPr>
+          <a:bodyPr/>
           <a:lstStyle/>
           <a:p>
             <a:r>
               <a:rPr lang="en-US" dirty="0" smtClean="0"/>
-              <a:t>Developed and maintained by TI CGT team</a:t>
+              <a:t>There are some “tricks” we have to use to get the compiler to perform some operations</a:t>
             </a:r>
           </a:p>
           <a:p>
             <a:pPr lvl="1"/>
             <a:r>
               <a:rPr lang="en-US" dirty="0" smtClean="0"/>
-              <a:t>Remains very similar to other TI compilers</a:t>
-            </a:r>
-          </a:p>
-          <a:p>
+              <a:t>Variables have to be “mapped” to Constant Table entries</a:t>
+            </a:r>
+          </a:p>
+          <a:p>
+            <a:pPr lvl="1"/>
             <a:r>
               <a:rPr lang="en-US" dirty="0" smtClean="0"/>
-              <a:t>Full support of C/C++</a:t>
-            </a:r>
-          </a:p>
-          <a:p>
-            <a:pPr marL="227013" lvl="1" indent="-227013">
-              <a:spcBef>
-                <a:spcPts val="800"/>
-              </a:spcBef>
-              <a:buFontTx/>
-              <a:buChar char="•"/>
-            </a:pPr>
-            <a:r>
-              <a:rPr lang="en-US" sz="2000" dirty="0"/>
-              <a:t>Adds PRU-specific functionality</a:t>
+              <a:t>The compiler will automatically use the MAC unit if the --hardware_mac switch is passed to it</a:t>
             </a:r>
           </a:p>
           <a:p>
             <a:pPr lvl="1"/>
             <a:r>
               <a:rPr lang="en-US" dirty="0" smtClean="0"/>
-              <a:t>Can take advantage of PRU architectural features automatically</a:t>
+              <a:t>Optimization can be tricky; be sure to mark variables that can change via outside forces (e.g., host, other PRU core) as volatile</a:t>
             </a:r>
           </a:p>
           <a:p>
             <a:pPr lvl="1"/>
-            <a:r>
-              <a:rPr lang="en-US" dirty="0"/>
-              <a:t>Contains several </a:t>
-            </a:r>
-            <a:r>
-              <a:rPr lang="en-US" dirty="0" smtClean="0"/>
-              <a:t>intrinsic</a:t>
-            </a:r>
-          </a:p>
-          <a:p>
-            <a:pPr lvl="2"/>
-            <a:r>
-              <a:rPr lang="en-US" dirty="0" smtClean="0"/>
-              <a:t>List can be found in Compiler documentation</a:t>
-            </a:r>
-          </a:p>
-          <a:p>
-            <a:r>
-              <a:rPr lang="en-US" dirty="0" smtClean="0"/>
-              <a:t>Full instruction-set Assembler for hand-tuned routines </a:t>
-            </a:r>
-          </a:p>
-          <a:p>
             <a:endParaRPr lang="en-US" dirty="0"/>
           </a:p>
           <a:p>
+            <a:pPr lvl="1"/>
             <a:endParaRPr lang="en-US" dirty="0" smtClean="0"/>
-          </a:p>
-          <a:p>
-            <a:endParaRPr lang="en-US" dirty="0"/>
           </a:p>
         </p:txBody>
       </p:sp>
     </p:spTree>
     <p:extLst>
       <p:ext uri="{BB962C8B-B14F-4D97-AF65-F5344CB8AC3E}">
-        <p14:creationId xmlns:p14="http://schemas.microsoft.com/office/powerpoint/2010/main" val="2948680240"/>
+        <p14:creationId xmlns:p14="http://schemas.microsoft.com/office/powerpoint/2010/main" val="3634942926"/>
       </p:ext>
     </p:extLst>
   </p:cSld>
   <p:clrMapOvr>
     <a:masterClrMapping/>
   </p:clrMapOvr>
+  <mc:AlternateContent xmlns:mc="http://schemas.openxmlformats.org/markup-compatibility/2006" xmlns:p14="http://schemas.microsoft.com/office/powerpoint/2010/main">
+    <mc:Choice Requires="p14">
+      <p:transition spd="slow" p14:dur="2000"/>
+    </mc:Choice>
+    <mc:Fallback xmlns="">
+      <p:transition spd="slow"/>
+    </mc:Fallback>
+  </mc:AlternateContent>
   <p:timing>
     <p:tnLst>
       <p:par>
@@ -28348,7 +28082,7 @@
           <a:p>
             <a:r>
               <a:rPr lang="en-US" dirty="0" smtClean="0"/>
-              <a:t>TI PRU CGT Assembly vs C</a:t>
+              <a:t>Coding Considerations</a:t>
             </a:r>
             <a:endParaRPr lang="en-US" dirty="0"/>
           </a:p>
@@ -28366,138 +28100,63 @@
         </p:nvSpPr>
         <p:spPr/>
         <p:txBody>
-          <a:bodyPr>
-            <a:normAutofit fontScale="77500" lnSpcReduction="20000"/>
-          </a:bodyPr>
+          <a:bodyPr/>
           <a:lstStyle/>
           <a:p>
             <a:r>
-              <a:rPr lang="en-US" dirty="0" smtClean="0">
-                <a:solidFill>
-                  <a:srgbClr val="FF0000"/>
-                </a:solidFill>
-              </a:rPr>
-              <a:t>Advantages of coding in Assembly over C</a:t>
+              <a:rPr lang="en-US" dirty="0" smtClean="0"/>
+              <a:t>There are also some limitations</a:t>
             </a:r>
           </a:p>
           <a:p>
             <a:pPr lvl="1"/>
             <a:r>
+              <a:rPr lang="en-US" dirty="0"/>
+              <a:t>The C environment does not know that the final eight CT registers have a variable offset, and thus that feature cannot be easily utilized</a:t>
+            </a:r>
+          </a:p>
+          <a:p>
+            <a:pPr lvl="1"/>
+            <a:r>
               <a:rPr lang="en-US" dirty="0" smtClean="0"/>
-              <a:t>Code can be tweaked to save every last cycle and byte of RAM</a:t>
+              <a:t>The compiler does not currently use the scratchpad for register state saving</a:t>
+            </a:r>
+          </a:p>
+          <a:p>
+            <a:pPr lvl="2"/>
+            <a:r>
+              <a:rPr lang="en-US" dirty="0" smtClean="0"/>
+              <a:t>This support is tentatively planned for a future CGT release</a:t>
             </a:r>
           </a:p>
           <a:p>
             <a:pPr lvl="1"/>
-            <a:r>
-              <a:rPr lang="en-US" dirty="0" smtClean="0"/>
-              <a:t>No need to rely on the compiler to make code </a:t>
-            </a:r>
-            <a:r>
-              <a:rPr lang="en-US" dirty="0" smtClean="0"/>
-              <a:t>efficient</a:t>
-            </a:r>
             <a:endParaRPr lang="en-US" dirty="0" smtClean="0"/>
           </a:p>
           <a:p>
             <a:pPr lvl="1"/>
-            <a:r>
-              <a:rPr lang="en-US" dirty="0" smtClean="0"/>
-              <a:t>Easily make use of scratchpad</a:t>
-            </a:r>
-          </a:p>
-          <a:p>
-            <a:pPr marL="341312" lvl="1" indent="0">
-              <a:buNone/>
-            </a:pPr>
             <a:endParaRPr lang="en-US" dirty="0" smtClean="0"/>
-          </a:p>
-          <a:p>
-            <a:r>
-              <a:rPr lang="en-US" dirty="0" smtClean="0">
-                <a:solidFill>
-                  <a:srgbClr val="FF0000"/>
-                </a:solidFill>
-              </a:rPr>
-              <a:t>Advantages of </a:t>
-            </a:r>
-            <a:r>
-              <a:rPr lang="en-US" dirty="0">
-                <a:solidFill>
-                  <a:srgbClr val="FF0000"/>
-                </a:solidFill>
-              </a:rPr>
-              <a:t>coding in </a:t>
-            </a:r>
-            <a:r>
-              <a:rPr lang="en-US" dirty="0" smtClean="0">
-                <a:solidFill>
-                  <a:srgbClr val="FF0000"/>
-                </a:solidFill>
-              </a:rPr>
-              <a:t>C over Assembly</a:t>
-            </a:r>
-            <a:endParaRPr lang="en-US" dirty="0">
-              <a:solidFill>
-                <a:srgbClr val="FF0000"/>
-              </a:solidFill>
-            </a:endParaRPr>
-          </a:p>
-          <a:p>
-            <a:pPr lvl="1"/>
-            <a:r>
-              <a:rPr lang="en-US" dirty="0"/>
-              <a:t>More code </a:t>
-            </a:r>
-            <a:r>
-              <a:rPr lang="en-US" dirty="0" smtClean="0"/>
-              <a:t>reusability</a:t>
-            </a:r>
-          </a:p>
-          <a:p>
-            <a:pPr lvl="1"/>
-            <a:r>
-              <a:rPr lang="en-US" dirty="0" smtClean="0"/>
-              <a:t>Can directly leverage kernel headers for interaction with kernel drivers</a:t>
-            </a:r>
-          </a:p>
-          <a:p>
-            <a:pPr lvl="1"/>
-            <a:r>
-              <a:rPr lang="en-US" dirty="0" smtClean="0"/>
-              <a:t>Optimizer is extremely intelligent at optimizing routines</a:t>
-            </a:r>
-          </a:p>
-          <a:p>
-            <a:pPr lvl="2"/>
-            <a:r>
-              <a:rPr lang="en-US" dirty="0" smtClean="0"/>
-              <a:t>“Accelerating” math via MAC unit, implementing LOOP instruction, etc.</a:t>
-            </a:r>
-          </a:p>
-          <a:p>
-            <a:pPr lvl="1"/>
-            <a:r>
-              <a:rPr lang="en-US" dirty="0" smtClean="0"/>
-              <a:t>Not mutually exclusive - inline Assembly can be easily added to a C project</a:t>
-            </a:r>
-          </a:p>
-          <a:p>
-            <a:pPr lvl="1"/>
-            <a:endParaRPr lang="en-US" dirty="0"/>
           </a:p>
         </p:txBody>
       </p:sp>
     </p:spTree>
     <p:extLst>
       <p:ext uri="{BB962C8B-B14F-4D97-AF65-F5344CB8AC3E}">
-        <p14:creationId xmlns:p14="http://schemas.microsoft.com/office/powerpoint/2010/main" val="3922463235"/>
+        <p14:creationId xmlns:p14="http://schemas.microsoft.com/office/powerpoint/2010/main" val="3194774550"/>
       </p:ext>
     </p:extLst>
   </p:cSld>
   <p:clrMapOvr>
     <a:masterClrMapping/>
   </p:clrMapOvr>
+  <mc:AlternateContent xmlns:mc="http://schemas.openxmlformats.org/markup-compatibility/2006" xmlns:p14="http://schemas.microsoft.com/office/powerpoint/2010/main">
+    <mc:Choice Requires="p14">
+      <p:transition spd="slow" p14:dur="2000"/>
+    </mc:Choice>
+    <mc:Fallback xmlns="">
+      <p:transition spd="slow"/>
+    </mc:Fallback>
+  </mc:AlternateContent>
   <p:timing>
     <p:tnLst>
       <p:par>
@@ -28509,7 +28168,7 @@
 </file>
 
 <file path=ppt/slides/slide46.xml><?xml version="1.0" encoding="utf-8"?>
-<p:sld xmlns:a="http://schemas.openxmlformats.org/drawingml/2006/main" xmlns:r="http://schemas.openxmlformats.org/officeDocument/2006/relationships" xmlns:p="http://schemas.openxmlformats.org/presentationml/2006/main" show="0">
+<p:sld xmlns:a="http://schemas.openxmlformats.org/drawingml/2006/main" xmlns:r="http://schemas.openxmlformats.org/officeDocument/2006/relationships" xmlns:p="http://schemas.openxmlformats.org/presentationml/2006/main">
   <p:cSld>
     <p:spTree>
       <p:nvGrpSpPr>
@@ -28537,14 +28196,16 @@
         </p:nvSpPr>
         <p:spPr/>
         <p:txBody>
-          <a:bodyPr/>
+          <a:bodyPr>
+            <a:normAutofit/>
+          </a:bodyPr>
           <a:lstStyle/>
           <a:p>
             <a:r>
-              <a:rPr lang="en-US" dirty="0" smtClean="0"/>
-              <a:t>Coding Considerations</a:t>
-            </a:r>
-            <a:endParaRPr lang="en-US" dirty="0"/>
+              <a:rPr lang="en-US" sz="3600" dirty="0" smtClean="0"/>
+              <a:t>CGT C programming and CGT Assembly</a:t>
+            </a:r>
+            <a:endParaRPr lang="en-US" sz="3600" dirty="0"/>
           </a:p>
         </p:txBody>
       </p:sp>
@@ -28560,63 +28221,133 @@
         </p:nvSpPr>
         <p:spPr/>
         <p:txBody>
-          <a:bodyPr/>
+          <a:bodyPr>
+            <a:normAutofit fontScale="77500" lnSpcReduction="20000"/>
+          </a:bodyPr>
           <a:lstStyle/>
           <a:p>
             <a:r>
+              <a:rPr lang="en-US" dirty="0" smtClean="0">
+                <a:solidFill>
+                  <a:srgbClr val="FF0000"/>
+                </a:solidFill>
+              </a:rPr>
+              <a:t>Advantages of coding in Assembly over C</a:t>
+            </a:r>
+          </a:p>
+          <a:p>
+            <a:pPr lvl="1"/>
+            <a:r>
               <a:rPr lang="en-US" dirty="0" smtClean="0"/>
-              <a:t>There are some “tricks” we have to use to get the compiler to perform some operations</a:t>
+              <a:t>Code can be tweaked to save every last cycle and byte of RAM</a:t>
             </a:r>
           </a:p>
           <a:p>
             <a:pPr lvl="1"/>
             <a:r>
               <a:rPr lang="en-US" dirty="0" smtClean="0"/>
-              <a:t>Variables have to be “mapped” to Constant Table entries</a:t>
+              <a:t>No need to rely on the compiler to make code efficient</a:t>
             </a:r>
           </a:p>
           <a:p>
             <a:pPr lvl="1"/>
             <a:r>
               <a:rPr lang="en-US" dirty="0" smtClean="0"/>
-              <a:t>The compiler will automatically use the MAC unit if the --hardware_mac switch is passed to it</a:t>
-            </a:r>
+              <a:t>Easily make use of scratchpad</a:t>
+            </a:r>
+          </a:p>
+          <a:p>
+            <a:pPr marL="341312" lvl="1" indent="0">
+              <a:buNone/>
+            </a:pPr>
+            <a:endParaRPr lang="en-US" dirty="0" smtClean="0"/>
+          </a:p>
+          <a:p>
+            <a:r>
+              <a:rPr lang="en-US" dirty="0" smtClean="0">
+                <a:solidFill>
+                  <a:srgbClr val="FF0000"/>
+                </a:solidFill>
+              </a:rPr>
+              <a:t>Advantages of </a:t>
+            </a:r>
+            <a:r>
+              <a:rPr lang="en-US" dirty="0">
+                <a:solidFill>
+                  <a:srgbClr val="FF0000"/>
+                </a:solidFill>
+              </a:rPr>
+              <a:t>coding in </a:t>
+            </a:r>
+            <a:r>
+              <a:rPr lang="en-US" dirty="0" smtClean="0">
+                <a:solidFill>
+                  <a:srgbClr val="FF0000"/>
+                </a:solidFill>
+              </a:rPr>
+              <a:t>C over Assembly</a:t>
+            </a:r>
+            <a:endParaRPr lang="en-US" dirty="0">
+              <a:solidFill>
+                <a:srgbClr val="FF0000"/>
+              </a:solidFill>
+            </a:endParaRPr>
           </a:p>
           <a:p>
             <a:pPr lvl="1"/>
             <a:r>
+              <a:rPr lang="en-US" dirty="0"/>
+              <a:t>More code </a:t>
+            </a:r>
+            <a:r>
               <a:rPr lang="en-US" dirty="0" smtClean="0"/>
-              <a:t>Optimization can be tricky; be sure to mark variables that can change via outside forces (e.g., host, other PRU core) as volatile</a:t>
+              <a:t>reusability</a:t>
+            </a:r>
+          </a:p>
+          <a:p>
+            <a:pPr lvl="1"/>
+            <a:r>
+              <a:rPr lang="en-US" dirty="0" smtClean="0"/>
+              <a:t>Can directly leverage kernel headers for interaction with kernel drivers</a:t>
+            </a:r>
+          </a:p>
+          <a:p>
+            <a:pPr lvl="1"/>
+            <a:r>
+              <a:rPr lang="en-US" dirty="0" smtClean="0"/>
+              <a:t>Optimizer is extremely intelligent at optimizing routines</a:t>
+            </a:r>
+          </a:p>
+          <a:p>
+            <a:pPr lvl="2"/>
+            <a:r>
+              <a:rPr lang="en-US" dirty="0" smtClean="0"/>
+              <a:t>“Accelerating” math via MAC unit, implementing LOOP instruction, etc.</a:t>
+            </a:r>
+          </a:p>
+          <a:p>
+            <a:pPr lvl="1"/>
+            <a:r>
+              <a:rPr lang="en-US" dirty="0" smtClean="0"/>
+              <a:t>Not mutually exclusive - inline Assembly can be easily added to a C project</a:t>
             </a:r>
           </a:p>
           <a:p>
             <a:pPr lvl="1"/>
             <a:endParaRPr lang="en-US" dirty="0"/>
-          </a:p>
-          <a:p>
-            <a:pPr lvl="1"/>
-            <a:endParaRPr lang="en-US" dirty="0" smtClean="0"/>
           </a:p>
         </p:txBody>
       </p:sp>
     </p:spTree>
     <p:extLst>
       <p:ext uri="{BB962C8B-B14F-4D97-AF65-F5344CB8AC3E}">
-        <p14:creationId xmlns:p14="http://schemas.microsoft.com/office/powerpoint/2010/main" val="1901287150"/>
+        <p14:creationId xmlns:p14="http://schemas.microsoft.com/office/powerpoint/2010/main" val="3922463235"/>
       </p:ext>
     </p:extLst>
   </p:cSld>
   <p:clrMapOvr>
     <a:masterClrMapping/>
   </p:clrMapOvr>
-  <mc:AlternateContent xmlns:mc="http://schemas.openxmlformats.org/markup-compatibility/2006">
-    <mc:Choice xmlns:p14="http://schemas.microsoft.com/office/powerpoint/2010/main" Requires="p14">
-      <p:transition spd="slow" p14:dur="2000"/>
-    </mc:Choice>
-    <mc:Fallback>
-      <p:transition spd="slow"/>
-    </mc:Fallback>
-  </mc:AlternateContent>
   <p:timing>
     <p:tnLst>
       <p:par>
@@ -28646,6 +28377,63 @@
       </p:grpSpPr>
       <p:sp>
         <p:nvSpPr>
+          <p:cNvPr id="8" name="Rectangle 7"/>
+          <p:cNvSpPr/>
+          <p:nvPr/>
+        </p:nvSpPr>
+        <p:spPr>
+          <a:xfrm>
+            <a:off x="550609" y="5036726"/>
+            <a:ext cx="7924800" cy="1042219"/>
+          </a:xfrm>
+          <a:prstGeom prst="rect">
+            <a:avLst/>
+          </a:prstGeom>
+          <a:solidFill>
+            <a:srgbClr val="FFFF00"/>
+          </a:solidFill>
+          <a:ln>
+            <a:noFill/>
+          </a:ln>
+        </p:spPr>
+        <p:style>
+          <a:lnRef idx="2">
+            <a:schemeClr val="accent1">
+              <a:shade val="50000"/>
+            </a:schemeClr>
+          </a:lnRef>
+          <a:fillRef idx="1">
+            <a:schemeClr val="accent1"/>
+          </a:fillRef>
+          <a:effectRef idx="0">
+            <a:schemeClr val="accent1"/>
+          </a:effectRef>
+          <a:fontRef idx="minor">
+            <a:schemeClr val="lt1"/>
+          </a:fontRef>
+        </p:style>
+        <p:txBody>
+          <a:bodyPr rtlCol="0" anchor="ctr"/>
+          <a:lstStyle/>
+          <a:p>
+            <a:pPr algn="ctr" fontAlgn="base">
+              <a:spcBef>
+                <a:spcPct val="0"/>
+              </a:spcBef>
+              <a:spcAft>
+                <a:spcPct val="0"/>
+              </a:spcAft>
+            </a:pPr>
+            <a:endParaRPr lang="en-US" dirty="0">
+              <a:solidFill>
+                <a:srgbClr val="FFFFFF"/>
+              </a:solidFill>
+            </a:endParaRPr>
+          </a:p>
+        </p:txBody>
+      </p:sp>
+      <p:sp>
+        <p:nvSpPr>
           <p:cNvPr id="2" name="Title 1"/>
           <p:cNvSpPr>
             <a:spLocks noGrp="1"/>
@@ -28654,16 +28442,23 @@
             <p:ph type="title"/>
           </p:nvPr>
         </p:nvSpPr>
-        <p:spPr/>
+        <p:spPr>
+          <a:xfrm>
+            <a:off x="457200" y="274638"/>
+            <a:ext cx="8229600" cy="639762"/>
+          </a:xfrm>
+        </p:spPr>
         <p:txBody>
-          <a:bodyPr/>
+          <a:bodyPr>
+            <a:normAutofit fontScale="90000"/>
+          </a:bodyPr>
           <a:lstStyle/>
           <a:p>
             <a:r>
-              <a:rPr lang="en-US" dirty="0" smtClean="0"/>
-              <a:t>Coding Considerations</a:t>
-            </a:r>
-            <a:endParaRPr lang="en-US" dirty="0"/>
+              <a:rPr lang="fr-FR" sz="3600" dirty="0" smtClean="0"/>
+              <a:t>TI PRU CGT Assembler vs PASM</a:t>
+            </a:r>
+            <a:endParaRPr lang="en-US" sz="3600" dirty="0"/>
           </a:p>
         </p:txBody>
       </p:sp>
@@ -28677,62 +28472,306 @@
             <p:ph idx="1"/>
           </p:nvPr>
         </p:nvSpPr>
-        <p:spPr/>
+        <p:spPr>
+          <a:xfrm>
+            <a:off x="279146" y="954059"/>
+            <a:ext cx="8467725" cy="5189120"/>
+          </a:xfrm>
+        </p:spPr>
         <p:txBody>
-          <a:bodyPr/>
+          <a:bodyPr>
+            <a:normAutofit lnSpcReduction="10000"/>
+          </a:bodyPr>
           <a:lstStyle/>
           <a:p>
-            <a:r>
-              <a:rPr lang="en-US" dirty="0" smtClean="0"/>
-              <a:t>There are also some limitations</a:t>
-            </a:r>
-          </a:p>
-          <a:p>
-            <a:pPr lvl="1"/>
-            <a:r>
-              <a:rPr lang="en-US" dirty="0"/>
-              <a:t>The C environment does not know that the final eight CT registers have a variable offset, and thus that feature cannot be easily utilized</a:t>
-            </a:r>
-          </a:p>
-          <a:p>
-            <a:pPr lvl="1"/>
-            <a:r>
-              <a:rPr lang="en-US" dirty="0" smtClean="0"/>
-              <a:t>The compiler does not currently use the scratchpad for register state saving</a:t>
-            </a:r>
-          </a:p>
-          <a:p>
-            <a:pPr lvl="2"/>
-            <a:r>
-              <a:rPr lang="en-US" dirty="0" smtClean="0"/>
-              <a:t>This support is tentatively planned for a future CGT release</a:t>
-            </a:r>
-          </a:p>
-          <a:p>
-            <a:pPr lvl="1"/>
-            <a:endParaRPr lang="en-US" dirty="0" smtClean="0"/>
-          </a:p>
-          <a:p>
-            <a:pPr lvl="1"/>
-            <a:endParaRPr lang="en-US" dirty="0" smtClean="0"/>
+            <a:pPr marL="336550" indent="-342900">
+              <a:buFont typeface="Arial" panose="020B0604020202020204" pitchFamily="34" charset="0"/>
+              <a:buChar char="•"/>
+            </a:pPr>
+            <a:r>
+              <a:rPr lang="en-US" sz="2600" b="1" dirty="0" smtClean="0">
+                <a:solidFill>
+                  <a:srgbClr val="FF0000"/>
+                </a:solidFill>
+              </a:rPr>
+              <a:t>Advantages </a:t>
+            </a:r>
+            <a:r>
+              <a:rPr lang="en-US" sz="2600" b="1" dirty="0">
+                <a:solidFill>
+                  <a:srgbClr val="FF0000"/>
+                </a:solidFill>
+              </a:rPr>
+              <a:t>of using TI PRU </a:t>
+            </a:r>
+            <a:r>
+              <a:rPr lang="en-US" sz="2600" b="1" dirty="0" smtClean="0">
+                <a:solidFill>
+                  <a:srgbClr val="FF0000"/>
+                </a:solidFill>
+              </a:rPr>
+              <a:t>CGT Assembler </a:t>
+            </a:r>
+            <a:r>
+              <a:rPr lang="en-US" sz="2600" b="1" dirty="0">
+                <a:solidFill>
+                  <a:srgbClr val="FF0000"/>
+                </a:solidFill>
+              </a:rPr>
+              <a:t>over PASM</a:t>
+            </a:r>
+          </a:p>
+          <a:p>
+            <a:pPr marL="695325" lvl="1" indent="-285750">
+              <a:spcBef>
+                <a:spcPct val="15000"/>
+              </a:spcBef>
+              <a:buFont typeface="Arial" panose="020B0604020202020204" pitchFamily="34" charset="0"/>
+              <a:buChar char="•"/>
+            </a:pPr>
+            <a:r>
+              <a:rPr lang="en-US" sz="1600" b="1" dirty="0">
+                <a:solidFill>
+                  <a:srgbClr val="000000"/>
+                </a:solidFill>
+              </a:rPr>
+              <a:t>The biggest advantage is that the TI PRU linker produces ELF files that enable source-level debugging within CCS.  No more debugging in disassembly window!!</a:t>
+            </a:r>
+          </a:p>
+          <a:p>
+            <a:pPr marL="695325" lvl="1" indent="-285750">
+              <a:spcBef>
+                <a:spcPct val="15000"/>
+              </a:spcBef>
+              <a:buFont typeface="Arial" panose="020B0604020202020204" pitchFamily="34" charset="0"/>
+              <a:buChar char="•"/>
+            </a:pPr>
+            <a:r>
+              <a:rPr lang="en-US" sz="1600" b="1" dirty="0">
+                <a:solidFill>
+                  <a:srgbClr val="000000"/>
+                </a:solidFill>
+              </a:rPr>
+              <a:t>The TI PRU assembler uses the same shell as other TI compilers.  Customers only need to learn one set of conventions, directives, etc.</a:t>
+            </a:r>
+          </a:p>
+          <a:p>
+            <a:pPr marL="695325" lvl="1" indent="-285750">
+              <a:spcBef>
+                <a:spcPct val="15000"/>
+              </a:spcBef>
+              <a:buFont typeface="Arial" panose="020B0604020202020204" pitchFamily="34" charset="0"/>
+              <a:buChar char="•"/>
+            </a:pPr>
+            <a:r>
+              <a:rPr lang="en-US" sz="1600" b="1" dirty="0">
+                <a:solidFill>
+                  <a:srgbClr val="000000"/>
+                </a:solidFill>
+              </a:rPr>
+              <a:t>TI PRU assembler will be maintained in the future, while PASM will not be updated anymore. </a:t>
+            </a:r>
+          </a:p>
+          <a:p>
+            <a:pPr marL="695325" lvl="1" indent="-285750">
+              <a:spcBef>
+                <a:spcPct val="15000"/>
+              </a:spcBef>
+              <a:buFont typeface="Arial" panose="020B0604020202020204" pitchFamily="34" charset="0"/>
+              <a:buChar char="•"/>
+            </a:pPr>
+            <a:r>
+              <a:rPr lang="en-US" sz="1600" b="1" dirty="0">
+                <a:solidFill>
+                  <a:srgbClr val="000000"/>
+                </a:solidFill>
+              </a:rPr>
+              <a:t>The TI PRU assembler uses the </a:t>
+            </a:r>
+            <a:r>
+              <a:rPr lang="en-US" sz="1600" b="1" dirty="0" smtClean="0">
+                <a:solidFill>
+                  <a:srgbClr val="000000"/>
+                </a:solidFill>
+              </a:rPr>
+              <a:t>powerful </a:t>
+            </a:r>
+            <a:r>
+              <a:rPr lang="en-US" sz="1600" b="1" dirty="0">
+                <a:solidFill>
+                  <a:srgbClr val="000000"/>
+                </a:solidFill>
+              </a:rPr>
+              <a:t>TI linker which allows more flexibility then PASM and facilitates linking PRU programs with host CPU image for runtime loading and symbol sharing.</a:t>
+            </a:r>
+          </a:p>
+          <a:p>
+            <a:pPr lvl="2">
+              <a:spcBef>
+                <a:spcPct val="15000"/>
+              </a:spcBef>
+              <a:buFont typeface="Arial" panose="020B0604020202020204" pitchFamily="34" charset="0"/>
+              <a:buChar char="•"/>
+            </a:pPr>
+            <a:endParaRPr lang="en-US" sz="1600" b="1" dirty="0">
+              <a:solidFill>
+                <a:srgbClr val="000000"/>
+              </a:solidFill>
+            </a:endParaRPr>
+          </a:p>
+          <a:p>
+            <a:pPr marL="336550" indent="-342900">
+              <a:buFont typeface="Arial" panose="020B0604020202020204" pitchFamily="34" charset="0"/>
+              <a:buChar char="•"/>
+            </a:pPr>
+            <a:r>
+              <a:rPr lang="en-US" sz="2400" b="1" dirty="0">
+                <a:solidFill>
+                  <a:srgbClr val="FF0000"/>
+                </a:solidFill>
+              </a:rPr>
+              <a:t>Disadvantages </a:t>
+            </a:r>
+            <a:r>
+              <a:rPr lang="en-US" sz="2400" b="1" dirty="0" smtClean="0">
+                <a:solidFill>
+                  <a:srgbClr val="FF0000"/>
+                </a:solidFill>
+              </a:rPr>
+              <a:t>of </a:t>
+            </a:r>
+            <a:r>
+              <a:rPr lang="en-US" sz="2400" b="1" dirty="0">
+                <a:solidFill>
+                  <a:srgbClr val="FF0000"/>
+                </a:solidFill>
+              </a:rPr>
+              <a:t>using TI PRU Assembler over PASM</a:t>
+            </a:r>
+          </a:p>
+          <a:p>
+            <a:pPr marL="695325" lvl="1" indent="-285750">
+              <a:spcBef>
+                <a:spcPct val="15000"/>
+              </a:spcBef>
+              <a:buFont typeface="Arial" panose="020B0604020202020204" pitchFamily="34" charset="0"/>
+              <a:buChar char="•"/>
+            </a:pPr>
+            <a:r>
+              <a:rPr lang="en-US" sz="1600" b="1" dirty="0">
+                <a:solidFill>
+                  <a:srgbClr val="000000"/>
+                </a:solidFill>
+              </a:rPr>
+              <a:t>Have to learn new directives if already used to PASM</a:t>
+            </a:r>
+          </a:p>
+          <a:p>
+            <a:pPr marL="695325" lvl="1" indent="-285750">
+              <a:spcBef>
+                <a:spcPct val="15000"/>
+              </a:spcBef>
+              <a:buFont typeface="Arial" panose="020B0604020202020204" pitchFamily="34" charset="0"/>
+              <a:buChar char="•"/>
+            </a:pPr>
+            <a:r>
+              <a:rPr lang="en-US" sz="1600" b="1" dirty="0">
+                <a:solidFill>
+                  <a:srgbClr val="000000"/>
+                </a:solidFill>
+              </a:rPr>
+              <a:t>TI PRU assembler requires more command line options and a linker command file</a:t>
+            </a:r>
+            <a:r>
+              <a:rPr lang="en-US" sz="1600" b="1" dirty="0" smtClean="0">
+                <a:solidFill>
+                  <a:srgbClr val="000000"/>
+                </a:solidFill>
+              </a:rPr>
+              <a:t>.</a:t>
+            </a:r>
+          </a:p>
+          <a:p>
+            <a:pPr marL="695325" lvl="1" indent="-285750">
+              <a:spcBef>
+                <a:spcPct val="15000"/>
+              </a:spcBef>
+              <a:buFont typeface="Arial" panose="020B0604020202020204" pitchFamily="34" charset="0"/>
+              <a:buChar char="•"/>
+            </a:pPr>
+            <a:r>
+              <a:rPr lang="en-US" sz="1600" b="1" dirty="0" smtClean="0">
+                <a:solidFill>
+                  <a:srgbClr val="000000"/>
+                </a:solidFill>
+              </a:rPr>
+              <a:t>Some porting effort required for reusing legacy PASM projects.</a:t>
+            </a:r>
+            <a:endParaRPr lang="en-US" sz="1600" b="1" dirty="0">
+              <a:solidFill>
+                <a:srgbClr val="000000"/>
+              </a:solidFill>
+            </a:endParaRPr>
+          </a:p>
+          <a:p>
+            <a:pPr marL="854075" lvl="2" indent="-165100">
+              <a:spcBef>
+                <a:spcPct val="15000"/>
+              </a:spcBef>
+              <a:buFontTx/>
+              <a:buChar char="•"/>
+            </a:pPr>
+            <a:endParaRPr lang="en-US" sz="1400" b="1" dirty="0">
+              <a:solidFill>
+                <a:srgbClr val="000000"/>
+              </a:solidFill>
+            </a:endParaRPr>
+          </a:p>
+          <a:p>
+            <a:pPr marL="341312" lvl="1" indent="0">
+              <a:buSzTx/>
+              <a:buNone/>
+            </a:pPr>
+            <a:r>
+              <a:rPr lang="en-US" sz="1800" dirty="0">
+                <a:solidFill>
+                  <a:srgbClr val="000000"/>
+                </a:solidFill>
+              </a:rPr>
+              <a:t>There are some differences in the instructions and directives supported TI PRU Assembler versus PASM.  Theses are listed in the TI PRU Compiler package release notes which is located at the root of the install folder.</a:t>
+            </a:r>
+          </a:p>
+          <a:p>
+            <a:pPr marL="854075" lvl="2" indent="-165100">
+              <a:spcBef>
+                <a:spcPct val="15000"/>
+              </a:spcBef>
+              <a:buFontTx/>
+              <a:buChar char="•"/>
+            </a:pPr>
+            <a:endParaRPr lang="en-US" sz="1600" b="1" dirty="0">
+              <a:solidFill>
+                <a:srgbClr val="000000"/>
+              </a:solidFill>
+            </a:endParaRPr>
           </a:p>
         </p:txBody>
       </p:sp>
     </p:spTree>
     <p:extLst>
       <p:ext uri="{BB962C8B-B14F-4D97-AF65-F5344CB8AC3E}">
-        <p14:creationId xmlns:p14="http://schemas.microsoft.com/office/powerpoint/2010/main" val="94073413"/>
+        <p14:creationId xmlns:p14="http://schemas.microsoft.com/office/powerpoint/2010/main" val="3926777420"/>
       </p:ext>
     </p:extLst>
   </p:cSld>
   <p:clrMapOvr>
     <a:masterClrMapping/>
   </p:clrMapOvr>
-  <mc:AlternateContent xmlns:mc="http://schemas.openxmlformats.org/markup-compatibility/2006">
-    <mc:Choice xmlns:p14="http://schemas.microsoft.com/office/powerpoint/2010/main" Requires="p14">
+  <mc:AlternateContent xmlns:mc="http://schemas.openxmlformats.org/markup-compatibility/2006" xmlns:p14="http://schemas.microsoft.com/office/powerpoint/2010/main">
+    <mc:Choice Requires="p14">
       <p:transition spd="slow" p14:dur="2000"/>
     </mc:Choice>
-    <mc:Fallback>
+    <mc:Fallback xmlns="">
       <p:transition spd="slow"/>
     </mc:Fallback>
   </mc:AlternateContent>
@@ -28840,7 +28879,7 @@
           <a:p>
             <a:r>
               <a:rPr lang="en-US" sz="2000" dirty="0" smtClean="0"/>
-              <a:t>Developed to allow a user to program at the register-level or at a bit-field level</a:t>
+              <a:t>Allow user to program at the register-level or at a bit-field level</a:t>
             </a:r>
           </a:p>
           <a:p>
@@ -30471,11 +30510,11 @@
   <p:clrMapOvr>
     <a:masterClrMapping/>
   </p:clrMapOvr>
-  <mc:AlternateContent xmlns:mc="http://schemas.openxmlformats.org/markup-compatibility/2006">
-    <mc:Choice xmlns:p14="http://schemas.microsoft.com/office/powerpoint/2010/main" Requires="p14">
+  <mc:AlternateContent xmlns:mc="http://schemas.openxmlformats.org/markup-compatibility/2006" xmlns:p14="http://schemas.microsoft.com/office/powerpoint/2010/main">
+    <mc:Choice Requires="p14">
       <p:transition spd="slow" p14:dur="2000"/>
     </mc:Choice>
-    <mc:Fallback>
+    <mc:Fallback xmlns="">
       <p:transition spd="slow"/>
     </mc:Fallback>
   </mc:AlternateContent>
@@ -33171,14 +33210,14 @@
             <a:pPr lvl="1"/>
             <a:r>
               <a:rPr lang="en-US" sz="2400" dirty="0" smtClean="0"/>
-              <a:t>We will use it to communicate with our virtio device (vdev)</a:t>
+              <a:t>We will use it to communicate with virtio device (vdev)</a:t>
             </a:r>
           </a:p>
           <a:p>
             <a:pPr lvl="2"/>
             <a:r>
               <a:rPr lang="en-US" dirty="0" smtClean="0"/>
-              <a:t>There are several ‘standard’ vdevs, but we only use virtio_ring</a:t>
+              <a:t>There are several ‘standard’ vdevs, but only virtio_ring is used by TI software</a:t>
             </a:r>
           </a:p>
           <a:p>
@@ -33676,6 +33715,149 @@
       </p:par>
     </p:tnLst>
   </p:timing>
+</p:sld>
+</file>
+
+<file path=ppt/slides/slide58.xml><?xml version="1.0" encoding="utf-8"?>
+<p:sld xmlns:a="http://schemas.openxmlformats.org/drawingml/2006/main" xmlns:r="http://schemas.openxmlformats.org/officeDocument/2006/relationships" xmlns:p="http://schemas.openxmlformats.org/presentationml/2006/main">
+  <p:cSld>
+    <p:spTree>
+      <p:nvGrpSpPr>
+        <p:cNvPr id="1" name=""/>
+        <p:cNvGrpSpPr/>
+        <p:nvPr/>
+      </p:nvGrpSpPr>
+      <p:grpSpPr>
+        <a:xfrm>
+          <a:off x="0" y="0"/>
+          <a:ext cx="0" cy="0"/>
+          <a:chOff x="0" y="0"/>
+          <a:chExt cx="0" cy="0"/>
+        </a:xfrm>
+      </p:grpSpPr>
+      <p:sp>
+        <p:nvSpPr>
+          <p:cNvPr id="79874" name="Rectangle 2"/>
+          <p:cNvSpPr>
+            <a:spLocks noGrp="1" noChangeArrowheads="1"/>
+          </p:cNvSpPr>
+          <p:nvPr>
+            <p:ph type="title"/>
+          </p:nvPr>
+        </p:nvSpPr>
+        <p:spPr/>
+        <p:txBody>
+          <a:bodyPr/>
+          <a:lstStyle/>
+          <a:p>
+            <a:r>
+              <a:rPr lang="en-US" dirty="0" smtClean="0"/>
+              <a:t>For More Information</a:t>
+            </a:r>
+            <a:endParaRPr lang="en-US" dirty="0"/>
+          </a:p>
+        </p:txBody>
+      </p:sp>
+      <p:sp>
+        <p:nvSpPr>
+          <p:cNvPr id="79875" name="Rectangle 3"/>
+          <p:cNvSpPr>
+            <a:spLocks noGrp="1" noChangeArrowheads="1"/>
+          </p:cNvSpPr>
+          <p:nvPr>
+            <p:ph type="body" idx="1"/>
+          </p:nvPr>
+        </p:nvSpPr>
+        <p:spPr>
+          <a:xfrm>
+            <a:off x="609600" y="1219200"/>
+            <a:ext cx="7924800" cy="4876800"/>
+          </a:xfrm>
+        </p:spPr>
+        <p:txBody>
+          <a:bodyPr/>
+          <a:lstStyle/>
+          <a:p>
+            <a:endParaRPr lang="en-US" sz="2400" dirty="0" smtClean="0"/>
+          </a:p>
+          <a:p>
+            <a:r>
+              <a:rPr lang="en-US" sz="2400" dirty="0">
+                <a:solidFill>
+                  <a:srgbClr val="FF0000"/>
+                </a:solidFill>
+                <a:hlinkClick r:id="rId3"/>
+              </a:rPr>
+              <a:t>http://</a:t>
+            </a:r>
+            <a:r>
+              <a:rPr lang="en-US" sz="2400" dirty="0" smtClean="0">
+                <a:solidFill>
+                  <a:srgbClr val="FF0000"/>
+                </a:solidFill>
+                <a:hlinkClick r:id="rId3"/>
+              </a:rPr>
+              <a:t>processors.wiki.ti.com/index.php/Sitara_Linux_SDK_Getting_Started_Guide</a:t>
+            </a:r>
+            <a:endParaRPr lang="en-US" sz="2400" dirty="0" smtClean="0">
+              <a:solidFill>
+                <a:srgbClr val="FF0000"/>
+              </a:solidFill>
+            </a:endParaRPr>
+          </a:p>
+          <a:p>
+            <a:r>
+              <a:rPr lang="en-US" sz="2400" dirty="0">
+                <a:hlinkClick r:id="rId4"/>
+              </a:rPr>
+              <a:t>http</a:t>
+            </a:r>
+            <a:r>
+              <a:rPr lang="en-US" sz="2400">
+                <a:hlinkClick r:id="rId4"/>
+              </a:rPr>
+              <a:t>://</a:t>
+            </a:r>
+            <a:r>
+              <a:rPr lang="en-US" sz="2400" smtClean="0">
+                <a:hlinkClick r:id="rId4"/>
+              </a:rPr>
+              <a:t>www.ti.com/lsds/ti/arm/sitara_arm_cortex_a_processor/arm_cortex_a9_core/am437x_arm_cortex_a9/tools_software.page</a:t>
+            </a:r>
+            <a:endParaRPr lang="en-US" sz="2400" dirty="0"/>
+          </a:p>
+          <a:p>
+            <a:r>
+              <a:rPr lang="en-US" sz="2400" dirty="0" smtClean="0"/>
+              <a:t>For </a:t>
+            </a:r>
+            <a:r>
+              <a:rPr lang="en-US" sz="2400" dirty="0" smtClean="0"/>
+              <a:t>questions regarding topics covered in this training, visit the support forums at the </a:t>
+            </a:r>
+            <a:r>
+              <a:rPr lang="en-US" sz="2400" dirty="0" smtClean="0">
+                <a:hlinkClick r:id="rId5"/>
+              </a:rPr>
+              <a:t>TI E2E Community</a:t>
+            </a:r>
+            <a:r>
+              <a:rPr lang="en-US" sz="2400" dirty="0" smtClean="0"/>
+              <a:t> website.</a:t>
+            </a:r>
+          </a:p>
+        </p:txBody>
+      </p:sp>
+    </p:spTree>
+    <p:extLst>
+      <p:ext uri="{BB962C8B-B14F-4D97-AF65-F5344CB8AC3E}">
+        <p14:creationId xmlns:p14="http://schemas.microsoft.com/office/powerpoint/2010/main" val="7972151"/>
+      </p:ext>
+    </p:extLst>
+  </p:cSld>
+  <p:clrMapOvr>
+    <a:masterClrMapping/>
+  </p:clrMapOvr>
 </p:sld>
 </file>
 
@@ -36868,11 +37050,7 @@
           <a:p>
             <a:r>
               <a:rPr lang="en-US" dirty="0" smtClean="0"/>
-              <a:t>2 </a:t>
-            </a:r>
-            <a:r>
-              <a:rPr lang="en-US" dirty="0" smtClean="0"/>
-              <a:t>PRUs, each had private memory</a:t>
+              <a:t>2 PRUs, each had private memory</a:t>
             </a:r>
           </a:p>
           <a:p>
@@ -39443,7 +39621,7 @@
 </file>
 
 <file path=ppt/slides/slide9.xml><?xml version="1.0" encoding="utf-8"?>
-<p:sld xmlns:a="http://schemas.openxmlformats.org/drawingml/2006/main" xmlns:r="http://schemas.openxmlformats.org/officeDocument/2006/relationships" xmlns:p="http://schemas.openxmlformats.org/presentationml/2006/main">
+<p:sld xmlns:a="http://schemas.openxmlformats.org/drawingml/2006/main" xmlns:r="http://schemas.openxmlformats.org/officeDocument/2006/relationships" xmlns:p="http://schemas.openxmlformats.org/presentationml/2006/main" show="0">
   <p:cSld>
     <p:spTree>
       <p:nvGrpSpPr>
@@ -39548,6 +39726,14 @@
   <p:clrMapOvr>
     <a:masterClrMapping/>
   </p:clrMapOvr>
+  <mc:AlternateContent xmlns:mc="http://schemas.openxmlformats.org/markup-compatibility/2006" xmlns:p14="http://schemas.microsoft.com/office/powerpoint/2010/main">
+    <mc:Choice Requires="p14">
+      <p:transition spd="slow" p14:dur="2000"/>
+    </mc:Choice>
+    <mc:Fallback xmlns="">
+      <p:transition spd="slow"/>
+    </mc:Fallback>
+  </mc:AlternateContent>
   <p:timing>
     <p:tnLst>
       <p:par>

</xml_diff>

<commit_message>
Adding new Thank you page
</commit_message>
<xml_diff>
--- a/preliminary/Working/presentations/Sitara/PRU in Sitara Device.pptx
+++ b/preliminary/Working/presentations/Sitara/PRU in Sitara Device.pptx
@@ -65,7 +65,7 @@
     <p:sldId id="286" r:id="rId56"/>
     <p:sldId id="287" r:id="rId57"/>
     <p:sldId id="322" r:id="rId58"/>
-    <p:sldId id="344" r:id="rId59"/>
+    <p:sldId id="345" r:id="rId59"/>
   </p:sldIdLst>
   <p:sldSz cx="9144000" cy="6858000" type="screen4x3"/>
   <p:notesSz cx="7023100" cy="9309100"/>
@@ -249,7 +249,7 @@
           <a:p>
             <a:fld id="{8175A721-DFAB-4E45-89A8-776EFE3A7B3A}" type="datetimeFigureOut">
               <a:rPr lang="en-US" smtClean="0"/>
-              <a:t>11/7/2014</a:t>
+              <a:t>11/10/2014</a:t>
             </a:fld>
             <a:endParaRPr lang="en-US" dirty="0"/>
           </a:p>
@@ -600,7 +600,7 @@
           <a:p>
             <a:fld id="{A4701F91-29EB-40D2-B9D7-8C42FB260373}" type="datetime1">
               <a:rPr lang="en-US" smtClean="0"/>
-              <a:t>11/7/2014</a:t>
+              <a:t>11/10/2014</a:t>
             </a:fld>
             <a:endParaRPr lang="en-US" dirty="0"/>
           </a:p>
@@ -830,7 +830,7 @@
           <a:p>
             <a:fld id="{51E15663-ABC3-4907-8BC5-ADC9FA984BB7}" type="datetime1">
               <a:rPr lang="en-US" smtClean="0"/>
-              <a:t>11/7/2014</a:t>
+              <a:t>11/10/2014</a:t>
             </a:fld>
             <a:endParaRPr lang="en-US" dirty="0"/>
           </a:p>
@@ -1979,7 +1979,7 @@
           <a:p>
             <a:fld id="{A2E0F6EB-8074-47DC-B3A3-4A9DB8A85AA3}" type="datetime1">
               <a:rPr lang="en-US" smtClean="0"/>
-              <a:t>11/7/2014</a:t>
+              <a:t>11/10/2014</a:t>
             </a:fld>
             <a:endParaRPr lang="en-US" dirty="0"/>
           </a:p>
@@ -2087,7 +2087,7 @@
           <a:p>
             <a:fld id="{12E0C451-B760-44FC-ABFA-E0ADABCAE2A2}" type="datetime1">
               <a:rPr lang="en-US" smtClean="0"/>
-              <a:t>11/7/2014</a:t>
+              <a:t>11/10/2014</a:t>
             </a:fld>
             <a:endParaRPr lang="en-US" dirty="0"/>
           </a:p>
@@ -2304,7 +2304,7 @@
           <a:p>
             <a:fld id="{44180B62-1E4E-4603-B1AA-ED4D2BC6A1E5}" type="datetime1">
               <a:rPr lang="en-US" smtClean="0"/>
-              <a:t>11/7/2014</a:t>
+              <a:t>11/10/2014</a:t>
             </a:fld>
             <a:endParaRPr lang="en-US" dirty="0"/>
           </a:p>
@@ -2681,7 +2681,7 @@
           <a:p>
             <a:fld id="{A4701F91-29EB-40D2-B9D7-8C42FB260373}" type="datetime1">
               <a:rPr lang="en-US" smtClean="0"/>
-              <a:t>11/7/2014</a:t>
+              <a:t>11/10/2014</a:t>
             </a:fld>
             <a:endParaRPr lang="en-US" dirty="0"/>
           </a:p>
@@ -2717,90 +2717,6 @@
         <p14:creationId xmlns:p14="http://schemas.microsoft.com/office/powerpoint/2010/main" val="128245134"/>
       </p:ext>
     </p:extLst>
-  </p:cSld>
-  <p:clrMapOvr>
-    <a:masterClrMapping/>
-  </p:clrMapOvr>
-</p:notes>
-</file>
-
-<file path=ppt/notesSlides/notesSlide20.xml><?xml version="1.0" encoding="utf-8"?>
-<p:notes xmlns:a="http://schemas.openxmlformats.org/drawingml/2006/main" xmlns:r="http://schemas.openxmlformats.org/officeDocument/2006/relationships" xmlns:p="http://schemas.openxmlformats.org/presentationml/2006/main">
-  <p:cSld>
-    <p:spTree>
-      <p:nvGrpSpPr>
-        <p:cNvPr id="1" name=""/>
-        <p:cNvGrpSpPr/>
-        <p:nvPr/>
-      </p:nvGrpSpPr>
-      <p:grpSpPr>
-        <a:xfrm>
-          <a:off x="0" y="0"/>
-          <a:ext cx="0" cy="0"/>
-          <a:chOff x="0" y="0"/>
-          <a:chExt cx="0" cy="0"/>
-        </a:xfrm>
-      </p:grpSpPr>
-      <p:sp>
-        <p:nvSpPr>
-          <p:cNvPr id="7" name="Rectangle 7"/>
-          <p:cNvSpPr>
-            <a:spLocks noGrp="1" noChangeArrowheads="1"/>
-          </p:cNvSpPr>
-          <p:nvPr>
-            <p:ph type="sldNum" sz="quarter" idx="5"/>
-          </p:nvPr>
-        </p:nvSpPr>
-        <p:spPr>
-          <a:ln/>
-        </p:spPr>
-        <p:txBody>
-          <a:bodyPr/>
-          <a:lstStyle/>
-          <a:p>
-            <a:fld id="{59EAE9B4-13B3-4257-B5DB-68F933689ECC}" type="slidenum">
-              <a:rPr lang="en-US"/>
-              <a:pPr/>
-              <a:t>58</a:t>
-            </a:fld>
-            <a:endParaRPr lang="en-US" dirty="0"/>
-          </a:p>
-        </p:txBody>
-      </p:sp>
-      <p:sp>
-        <p:nvSpPr>
-          <p:cNvPr id="80898" name="Rectangle 2"/>
-          <p:cNvSpPr>
-            <a:spLocks noGrp="1" noRot="1" noChangeAspect="1" noChangeArrowheads="1" noTextEdit="1"/>
-          </p:cNvSpPr>
-          <p:nvPr>
-            <p:ph type="sldImg"/>
-          </p:nvPr>
-        </p:nvSpPr>
-        <p:spPr>
-          <a:ln/>
-        </p:spPr>
-      </p:sp>
-      <p:sp>
-        <p:nvSpPr>
-          <p:cNvPr id="80899" name="Rectangle 3"/>
-          <p:cNvSpPr>
-            <a:spLocks noGrp="1" noChangeArrowheads="1"/>
-          </p:cNvSpPr>
-          <p:nvPr>
-            <p:ph type="body" idx="1"/>
-          </p:nvPr>
-        </p:nvSpPr>
-        <p:spPr/>
-        <p:txBody>
-          <a:bodyPr/>
-          <a:lstStyle/>
-          <a:p>
-            <a:endParaRPr lang="en-US" dirty="0"/>
-          </a:p>
-        </p:txBody>
-      </p:sp>
-    </p:spTree>
   </p:cSld>
   <p:clrMapOvr>
     <a:masterClrMapping/>
@@ -4088,7 +4004,7 @@
           <a:p>
             <a:fld id="{7B8A4E2A-EC1C-49F2-86AD-0AF2DCEAA54C}" type="datetimeFigureOut">
               <a:rPr lang="en-US" smtClean="0"/>
-              <a:t>11/7/2014</a:t>
+              <a:t>11/10/2014</a:t>
             </a:fld>
             <a:endParaRPr lang="en-US" dirty="0"/>
           </a:p>
@@ -4258,7 +4174,7 @@
           <a:p>
             <a:fld id="{7B8A4E2A-EC1C-49F2-86AD-0AF2DCEAA54C}" type="datetimeFigureOut">
               <a:rPr lang="en-US" smtClean="0"/>
-              <a:t>11/7/2014</a:t>
+              <a:t>11/10/2014</a:t>
             </a:fld>
             <a:endParaRPr lang="en-US" dirty="0"/>
           </a:p>
@@ -4438,7 +4354,7 @@
           <a:p>
             <a:fld id="{7B8A4E2A-EC1C-49F2-86AD-0AF2DCEAA54C}" type="datetimeFigureOut">
               <a:rPr lang="en-US" smtClean="0"/>
-              <a:t>11/7/2014</a:t>
+              <a:t>11/10/2014</a:t>
             </a:fld>
             <a:endParaRPr lang="en-US" dirty="0"/>
           </a:p>
@@ -4608,7 +4524,7 @@
           <a:p>
             <a:fld id="{7B8A4E2A-EC1C-49F2-86AD-0AF2DCEAA54C}" type="datetimeFigureOut">
               <a:rPr lang="en-US" smtClean="0"/>
-              <a:t>11/7/2014</a:t>
+              <a:t>11/10/2014</a:t>
             </a:fld>
             <a:endParaRPr lang="en-US" dirty="0"/>
           </a:p>
@@ -4854,7 +4770,7 @@
           <a:p>
             <a:fld id="{7B8A4E2A-EC1C-49F2-86AD-0AF2DCEAA54C}" type="datetimeFigureOut">
               <a:rPr lang="en-US" smtClean="0"/>
-              <a:t>11/7/2014</a:t>
+              <a:t>11/10/2014</a:t>
             </a:fld>
             <a:endParaRPr lang="en-US" dirty="0"/>
           </a:p>
@@ -5142,7 +5058,7 @@
           <a:p>
             <a:fld id="{7B8A4E2A-EC1C-49F2-86AD-0AF2DCEAA54C}" type="datetimeFigureOut">
               <a:rPr lang="en-US" smtClean="0"/>
-              <a:t>11/7/2014</a:t>
+              <a:t>11/10/2014</a:t>
             </a:fld>
             <a:endParaRPr lang="en-US" dirty="0"/>
           </a:p>
@@ -5564,7 +5480,7 @@
           <a:p>
             <a:fld id="{7B8A4E2A-EC1C-49F2-86AD-0AF2DCEAA54C}" type="datetimeFigureOut">
               <a:rPr lang="en-US" smtClean="0"/>
-              <a:t>11/7/2014</a:t>
+              <a:t>11/10/2014</a:t>
             </a:fld>
             <a:endParaRPr lang="en-US" dirty="0"/>
           </a:p>
@@ -5682,7 +5598,7 @@
           <a:p>
             <a:fld id="{7B8A4E2A-EC1C-49F2-86AD-0AF2DCEAA54C}" type="datetimeFigureOut">
               <a:rPr lang="en-US" smtClean="0"/>
-              <a:t>11/7/2014</a:t>
+              <a:t>11/10/2014</a:t>
             </a:fld>
             <a:endParaRPr lang="en-US" dirty="0"/>
           </a:p>
@@ -5777,7 +5693,7 @@
           <a:p>
             <a:fld id="{7B8A4E2A-EC1C-49F2-86AD-0AF2DCEAA54C}" type="datetimeFigureOut">
               <a:rPr lang="en-US" smtClean="0"/>
-              <a:t>11/7/2014</a:t>
+              <a:t>11/10/2014</a:t>
             </a:fld>
             <a:endParaRPr lang="en-US" dirty="0"/>
           </a:p>
@@ -6054,7 +5970,7 @@
           <a:p>
             <a:fld id="{7B8A4E2A-EC1C-49F2-86AD-0AF2DCEAA54C}" type="datetimeFigureOut">
               <a:rPr lang="en-US" smtClean="0"/>
-              <a:t>11/7/2014</a:t>
+              <a:t>11/10/2014</a:t>
             </a:fld>
             <a:endParaRPr lang="en-US" dirty="0"/>
           </a:p>
@@ -6307,7 +6223,7 @@
           <a:p>
             <a:fld id="{7B8A4E2A-EC1C-49F2-86AD-0AF2DCEAA54C}" type="datetimeFigureOut">
               <a:rPr lang="en-US" smtClean="0"/>
-              <a:t>11/7/2014</a:t>
+              <a:t>11/10/2014</a:t>
             </a:fld>
             <a:endParaRPr lang="en-US" dirty="0"/>
           </a:p>
@@ -6520,7 +6436,7 @@
           <a:p>
             <a:fld id="{7B8A4E2A-EC1C-49F2-86AD-0AF2DCEAA54C}" type="datetimeFigureOut">
               <a:rPr lang="en-US" smtClean="0"/>
-              <a:t>11/7/2014</a:t>
+              <a:t>11/10/2014</a:t>
             </a:fld>
             <a:endParaRPr lang="en-US" dirty="0"/>
           </a:p>
@@ -33737,127 +33653,263 @@
       </p:grpSpPr>
       <p:sp>
         <p:nvSpPr>
-          <p:cNvPr id="79874" name="Rectangle 2"/>
+          <p:cNvPr id="2" name="Title 1"/>
           <p:cNvSpPr>
-            <a:spLocks noGrp="1" noChangeArrowheads="1"/>
+            <a:spLocks noGrp="1"/>
           </p:cNvSpPr>
           <p:nvPr>
-            <p:ph type="title"/>
-          </p:nvPr>
-        </p:nvSpPr>
-        <p:spPr/>
-        <p:txBody>
-          <a:bodyPr/>
-          <a:lstStyle/>
-          <a:p>
-            <a:r>
-              <a:rPr lang="en-US" dirty="0" smtClean="0"/>
-              <a:t>For More Information</a:t>
-            </a:r>
-            <a:endParaRPr lang="en-US" dirty="0"/>
-          </a:p>
-        </p:txBody>
-      </p:sp>
-      <p:sp>
-        <p:nvSpPr>
-          <p:cNvPr id="79875" name="Rectangle 3"/>
-          <p:cNvSpPr>
-            <a:spLocks noGrp="1" noChangeArrowheads="1"/>
-          </p:cNvSpPr>
-          <p:nvPr>
-            <p:ph type="body" idx="1"/>
+            <p:ph type="ctrTitle"/>
           </p:nvPr>
         </p:nvSpPr>
         <p:spPr>
           <a:xfrm>
-            <a:off x="609600" y="1219200"/>
-            <a:ext cx="7924800" cy="4876800"/>
+            <a:off x="2133600" y="381000"/>
+            <a:ext cx="5219700" cy="1470025"/>
           </a:xfrm>
         </p:spPr>
         <p:txBody>
           <a:bodyPr/>
           <a:lstStyle/>
           <a:p>
-            <a:endParaRPr lang="en-US" sz="2400" dirty="0" smtClean="0"/>
-          </a:p>
-          <a:p>
-            <a:r>
-              <a:rPr lang="en-US" sz="2400" dirty="0">
-                <a:solidFill>
-                  <a:srgbClr val="FF0000"/>
+            <a:r>
+              <a:rPr lang="en-US" dirty="0" smtClean="0"/>
+              <a:t>Thank you!</a:t>
+            </a:r>
+            <a:endParaRPr lang="en-US" dirty="0"/>
+          </a:p>
+        </p:txBody>
+      </p:sp>
+      <p:sp>
+        <p:nvSpPr>
+          <p:cNvPr id="3" name="Subtitle 2"/>
+          <p:cNvSpPr>
+            <a:spLocks noGrp="1"/>
+          </p:cNvSpPr>
+          <p:nvPr>
+            <p:ph type="subTitle" idx="1"/>
+          </p:nvPr>
+        </p:nvSpPr>
+        <p:spPr>
+          <a:xfrm>
+            <a:off x="381000" y="1524000"/>
+            <a:ext cx="8458200" cy="5334000"/>
+          </a:xfrm>
+        </p:spPr>
+        <p:txBody>
+          <a:bodyPr>
+            <a:normAutofit lnSpcReduction="10000"/>
+          </a:bodyPr>
+          <a:lstStyle/>
+          <a:p>
+            <a:pPr algn="l">
+              <a:spcBef>
+                <a:spcPts val="0"/>
+              </a:spcBef>
+            </a:pPr>
+            <a:r>
+              <a:rPr lang="en-US" b="0" dirty="0" smtClean="0"/>
+              <a:t>For more information about the PRU, visit: </a:t>
+            </a:r>
+          </a:p>
+          <a:p>
+            <a:pPr algn="l"/>
+            <a:endParaRPr lang="en-US" sz="400" b="0" dirty="0" smtClean="0"/>
+          </a:p>
+          <a:p>
+            <a:pPr algn="l">
+              <a:spcBef>
+                <a:spcPts val="1200"/>
+              </a:spcBef>
+            </a:pPr>
+            <a:r>
+              <a:rPr lang="en-US" dirty="0" smtClean="0"/>
+              <a:t>     </a:t>
+            </a:r>
+            <a:r>
+              <a:rPr lang="en-US" dirty="0" smtClean="0"/>
+              <a:t>Complete on-line training</a:t>
+            </a:r>
+            <a:r>
+              <a:rPr lang="en-US" dirty="0" smtClean="0"/>
+              <a:t> (boot Camp)</a:t>
+            </a:r>
+            <a:r>
+              <a:rPr lang="en-US" b="0" dirty="0" smtClean="0"/>
+              <a:t> </a:t>
+            </a:r>
+            <a:r>
+              <a:rPr lang="en-US" b="0" dirty="0" smtClean="0"/>
+              <a:t>– </a:t>
+            </a:r>
+            <a:endParaRPr lang="en-US" b="0" dirty="0" smtClean="0"/>
+          </a:p>
+          <a:p>
+            <a:pPr algn="l">
+              <a:spcBef>
+                <a:spcPts val="1200"/>
+              </a:spcBef>
+            </a:pPr>
+            <a:r>
+              <a:rPr lang="en-US" b="0" u="sng" dirty="0" smtClean="0">
+                <a:hlinkClick r:id="rId2"/>
+              </a:rPr>
+              <a:t>www.ti.com/sitarabootcamp</a:t>
+            </a:r>
+            <a:endParaRPr lang="en-US" b="0" dirty="0" smtClean="0"/>
+          </a:p>
+          <a:p>
+            <a:pPr algn="l">
+              <a:spcBef>
+                <a:spcPts val="1200"/>
+              </a:spcBef>
+            </a:pPr>
+            <a:r>
+              <a:rPr lang="en-US" dirty="0" smtClean="0"/>
+              <a:t>     PRU-ICSS Wiki – </a:t>
+            </a:r>
+            <a:r>
+              <a:rPr lang="en-US" b="0" dirty="0" smtClean="0">
+                <a:solidFill>
+                  <a:srgbClr val="0070C0"/>
                 </a:solidFill>
                 <a:hlinkClick r:id="rId3"/>
               </a:rPr>
-              <a:t>http://</a:t>
-            </a:r>
-            <a:r>
-              <a:rPr lang="en-US" sz="2400" dirty="0" smtClean="0">
-                <a:solidFill>
-                  <a:srgbClr val="FF0000"/>
+              <a:t>http</a:t>
+            </a:r>
+            <a:r>
+              <a:rPr lang="en-US" b="0" dirty="0">
+                <a:solidFill>
+                  <a:srgbClr val="0070C0"/>
                 </a:solidFill>
                 <a:hlinkClick r:id="rId3"/>
               </a:rPr>
-              <a:t>processors.wiki.ti.com/index.php/Sitara_Linux_SDK_Getting_Started_Guide</a:t>
-            </a:r>
-            <a:endParaRPr lang="en-US" sz="2400" dirty="0" smtClean="0">
-              <a:solidFill>
-                <a:srgbClr val="FF0000"/>
-              </a:solidFill>
-            </a:endParaRPr>
-          </a:p>
-          <a:p>
-            <a:r>
-              <a:rPr lang="en-US" sz="2400" dirty="0">
+              <a:t>://</a:t>
+            </a:r>
+            <a:r>
+              <a:rPr lang="en-US" b="0" dirty="0" smtClean="0">
+                <a:solidFill>
+                  <a:srgbClr val="0070C0"/>
+                </a:solidFill>
+                <a:hlinkClick r:id="rId3"/>
+              </a:rPr>
+              <a:t>processors.wiki.ti.com/index.php/PRU-ICSS</a:t>
+            </a:r>
+            <a:endParaRPr lang="en-US" b="0" dirty="0" smtClean="0"/>
+          </a:p>
+          <a:p>
+            <a:pPr algn="l">
+              <a:spcBef>
+                <a:spcPts val="1200"/>
+              </a:spcBef>
+            </a:pPr>
+            <a:r>
+              <a:rPr lang="en-US" dirty="0" smtClean="0"/>
+              <a:t>     PRU Evaluation Hardware </a:t>
+            </a:r>
+            <a:r>
+              <a:rPr lang="en-US" dirty="0"/>
+              <a:t>– </a:t>
+            </a:r>
+            <a:r>
+              <a:rPr lang="en-US" b="0" dirty="0" smtClean="0">
                 <a:hlinkClick r:id="rId4"/>
               </a:rPr>
               <a:t>http</a:t>
             </a:r>
             <a:r>
-              <a:rPr lang="en-US" sz="2400">
+              <a:rPr lang="en-US" b="0" dirty="0">
                 <a:hlinkClick r:id="rId4"/>
               </a:rPr>
               <a:t>://</a:t>
             </a:r>
             <a:r>
-              <a:rPr lang="en-US" sz="2400" smtClean="0">
+              <a:rPr lang="en-US" b="0" dirty="0" smtClean="0">
                 <a:hlinkClick r:id="rId4"/>
               </a:rPr>
-              <a:t>www.ti.com/lsds/ti/arm/sitara_arm_cortex_a_processor/arm_cortex_a9_core/am437x_arm_cortex_a9/tools_software.page</a:t>
-            </a:r>
-            <a:endParaRPr lang="en-US" sz="2400" dirty="0"/>
-          </a:p>
-          <a:p>
-            <a:r>
-              <a:rPr lang="en-US" sz="2400" dirty="0" smtClean="0"/>
-              <a:t>For </a:t>
-            </a:r>
-            <a:r>
-              <a:rPr lang="en-US" sz="2400" dirty="0" smtClean="0"/>
-              <a:t>questions regarding topics covered in this training, visit the support forums at the </a:t>
-            </a:r>
-            <a:r>
-              <a:rPr lang="en-US" sz="2400" dirty="0" smtClean="0">
+              <a:t>www.ti.com/tool/PRUCAPE</a:t>
+            </a:r>
+            <a:endParaRPr lang="en-US" b="0" dirty="0" smtClean="0"/>
+          </a:p>
+          <a:p>
+            <a:pPr algn="l">
+              <a:spcBef>
+                <a:spcPts val="1200"/>
+              </a:spcBef>
+            </a:pPr>
+            <a:r>
+              <a:rPr lang="en-US" dirty="0" smtClean="0"/>
+              <a:t>     Support </a:t>
+            </a:r>
+            <a:r>
+              <a:rPr lang="en-US" dirty="0"/>
+              <a:t>– </a:t>
+            </a:r>
+            <a:endParaRPr lang="en-US" dirty="0" smtClean="0"/>
+          </a:p>
+          <a:p>
+            <a:pPr algn="l">
+              <a:spcBef>
+                <a:spcPts val="1200"/>
+              </a:spcBef>
+            </a:pPr>
+            <a:r>
+              <a:rPr lang="en-US" b="0" dirty="0" smtClean="0">
                 <a:hlinkClick r:id="rId5"/>
               </a:rPr>
-              <a:t>TI E2E Community</a:t>
-            </a:r>
-            <a:r>
-              <a:rPr lang="en-US" sz="2400" dirty="0" smtClean="0"/>
-              <a:t> website.</a:t>
-            </a:r>
+              <a:t>http</a:t>
+            </a:r>
+            <a:r>
+              <a:rPr lang="en-US" b="0" dirty="0" smtClean="0">
+                <a:hlinkClick r:id="rId5"/>
+              </a:rPr>
+              <a:t>://e2e.ti.com</a:t>
+            </a:r>
+            <a:endParaRPr lang="en-US" dirty="0" smtClean="0">
+              <a:solidFill>
+                <a:srgbClr val="0070C0"/>
+              </a:solidFill>
+            </a:endParaRPr>
+          </a:p>
+          <a:p>
+            <a:endParaRPr lang="en-US" dirty="0">
+              <a:solidFill>
+                <a:schemeClr val="tx2"/>
+              </a:solidFill>
+            </a:endParaRPr>
+          </a:p>
+          <a:p>
+            <a:endParaRPr lang="en-US" dirty="0">
+              <a:solidFill>
+                <a:schemeClr val="tx2"/>
+              </a:solidFill>
+            </a:endParaRPr>
+          </a:p>
+          <a:p>
+            <a:endParaRPr lang="en-US" dirty="0">
+              <a:solidFill>
+                <a:schemeClr val="tx2"/>
+              </a:solidFill>
+            </a:endParaRPr>
           </a:p>
         </p:txBody>
       </p:sp>
     </p:spTree>
     <p:extLst>
       <p:ext uri="{BB962C8B-B14F-4D97-AF65-F5344CB8AC3E}">
-        <p14:creationId xmlns:p14="http://schemas.microsoft.com/office/powerpoint/2010/main" val="7972151"/>
+        <p14:creationId xmlns:p14="http://schemas.microsoft.com/office/powerpoint/2010/main" val="677502205"/>
       </p:ext>
     </p:extLst>
   </p:cSld>
   <p:clrMapOvr>
     <a:masterClrMapping/>
   </p:clrMapOvr>
+  <p:timing>
+    <p:tnLst>
+      <p:par>
+        <p:cTn id="1" dur="indefinite" restart="never" nodeType="tmRoot"/>
+      </p:par>
+    </p:tnLst>
+  </p:timing>
 </p:sld>
 </file>
 
@@ -33936,7 +33988,15 @@
             </a:pPr>
             <a:r>
               <a:rPr lang="en-US" sz="2000" dirty="0" smtClean="0"/>
-              <a:t>Reference Guide </a:t>
+              <a:t>User</a:t>
+            </a:r>
+            <a:r>
+              <a:rPr lang="en-US" sz="2000" dirty="0" smtClean="0"/>
+              <a:t> </a:t>
+            </a:r>
+            <a:r>
+              <a:rPr lang="en-US" sz="2000" dirty="0" smtClean="0"/>
+              <a:t>Guide </a:t>
             </a:r>
           </a:p>
           <a:p>
@@ -33956,17 +34016,12 @@
               <a:rPr lang="en-US" sz="2000" dirty="0" smtClean="0">
                 <a:hlinkClick r:id="rId3"/>
               </a:rPr>
-              <a:t>mythopoeic.org/BBB-PRU/am335xPruReferenceGuide.pdf</a:t>
-            </a:r>
-            <a:endParaRPr lang="en-US" sz="2000" dirty="0" smtClean="0"/>
-          </a:p>
-          <a:p>
-            <a:pPr marL="0" indent="0">
-              <a:lnSpc>
-                <a:spcPct val="110000"/>
-              </a:lnSpc>
-              <a:buNone/>
-            </a:pPr>
+              <a:t>processors.wiki.ti.com/index.php/PRU-ICSS</a:t>
+            </a:r>
+            <a:r>
+              <a:rPr lang="en-US" sz="2000" dirty="0" smtClean="0"/>
+              <a:t> </a:t>
+            </a:r>
             <a:endParaRPr lang="en-US" sz="2000" dirty="0" smtClean="0"/>
           </a:p>
         </p:txBody>

</xml_diff>